<commit_message>
Adicionado o plano da interacao 02 e modificado o plano do projeto colocando as estimativas de cada requisito
</commit_message>
<xml_diff>
--- a/Projeto SysTI/000-Gerencia Do Projeto/PPJ-Plano de Projeto.pptx
+++ b/Projeto SysTI/000-Gerencia Do Projeto/PPJ-Plano de Projeto.pptx
@@ -4504,637 +4504,7 @@
                 </a:uFill>
                 <a:latin typeface="Arial"/>
               </a:rPr>
-              <a:t>C</a:t>
-            </a:r>
-            <a:r>
-              <a:rPr b="0" lang="pt-BR" sz="4400" spc="-1" strike="noStrike">
-                <a:solidFill>
-                  <a:srgbClr val="000000"/>
-                </a:solidFill>
-                <a:uFill>
-                  <a:solidFill>
-                    <a:srgbClr val="ffffff"/>
-                  </a:solidFill>
-                </a:uFill>
-                <a:latin typeface="Arial"/>
-              </a:rPr>
-              <a:t>l</a:t>
-            </a:r>
-            <a:r>
-              <a:rPr b="0" lang="pt-BR" sz="4400" spc="-1" strike="noStrike">
-                <a:solidFill>
-                  <a:srgbClr val="000000"/>
-                </a:solidFill>
-                <a:uFill>
-                  <a:solidFill>
-                    <a:srgbClr val="ffffff"/>
-                  </a:solidFill>
-                </a:uFill>
-                <a:latin typeface="Arial"/>
-              </a:rPr>
-              <a:t>i</a:t>
-            </a:r>
-            <a:r>
-              <a:rPr b="0" lang="pt-BR" sz="4400" spc="-1" strike="noStrike">
-                <a:solidFill>
-                  <a:srgbClr val="000000"/>
-                </a:solidFill>
-                <a:uFill>
-                  <a:solidFill>
-                    <a:srgbClr val="ffffff"/>
-                  </a:solidFill>
-                </a:uFill>
-                <a:latin typeface="Arial"/>
-              </a:rPr>
-              <a:t>q</a:t>
-            </a:r>
-            <a:r>
-              <a:rPr b="0" lang="pt-BR" sz="4400" spc="-1" strike="noStrike">
-                <a:solidFill>
-                  <a:srgbClr val="000000"/>
-                </a:solidFill>
-                <a:uFill>
-                  <a:solidFill>
-                    <a:srgbClr val="ffffff"/>
-                  </a:solidFill>
-                </a:uFill>
-                <a:latin typeface="Arial"/>
-              </a:rPr>
-              <a:t>u</a:t>
-            </a:r>
-            <a:r>
-              <a:rPr b="0" lang="pt-BR" sz="4400" spc="-1" strike="noStrike">
-                <a:solidFill>
-                  <a:srgbClr val="000000"/>
-                </a:solidFill>
-                <a:uFill>
-                  <a:solidFill>
-                    <a:srgbClr val="ffffff"/>
-                  </a:solidFill>
-                </a:uFill>
-                <a:latin typeface="Arial"/>
-              </a:rPr>
-              <a:t>e</a:t>
-            </a:r>
-            <a:r>
-              <a:rPr b="0" lang="pt-BR" sz="4400" spc="-1" strike="noStrike">
-                <a:solidFill>
-                  <a:srgbClr val="000000"/>
-                </a:solidFill>
-                <a:uFill>
-                  <a:solidFill>
-                    <a:srgbClr val="ffffff"/>
-                  </a:solidFill>
-                </a:uFill>
-                <a:latin typeface="Arial"/>
-              </a:rPr>
-              <a:t> </a:t>
-            </a:r>
-            <a:r>
-              <a:rPr b="0" lang="pt-BR" sz="4400" spc="-1" strike="noStrike">
-                <a:solidFill>
-                  <a:srgbClr val="000000"/>
-                </a:solidFill>
-                <a:uFill>
-                  <a:solidFill>
-                    <a:srgbClr val="ffffff"/>
-                  </a:solidFill>
-                </a:uFill>
-                <a:latin typeface="Arial"/>
-              </a:rPr>
-              <a:t>p</a:t>
-            </a:r>
-            <a:r>
-              <a:rPr b="0" lang="pt-BR" sz="4400" spc="-1" strike="noStrike">
-                <a:solidFill>
-                  <a:srgbClr val="000000"/>
-                </a:solidFill>
-                <a:uFill>
-                  <a:solidFill>
-                    <a:srgbClr val="ffffff"/>
-                  </a:solidFill>
-                </a:uFill>
-                <a:latin typeface="Arial"/>
-              </a:rPr>
-              <a:t>a</a:t>
-            </a:r>
-            <a:r>
-              <a:rPr b="0" lang="pt-BR" sz="4400" spc="-1" strike="noStrike">
-                <a:solidFill>
-                  <a:srgbClr val="000000"/>
-                </a:solidFill>
-                <a:uFill>
-                  <a:solidFill>
-                    <a:srgbClr val="ffffff"/>
-                  </a:solidFill>
-                </a:uFill>
-                <a:latin typeface="Arial"/>
-              </a:rPr>
-              <a:t>r</a:t>
-            </a:r>
-            <a:r>
-              <a:rPr b="0" lang="pt-BR" sz="4400" spc="-1" strike="noStrike">
-                <a:solidFill>
-                  <a:srgbClr val="000000"/>
-                </a:solidFill>
-                <a:uFill>
-                  <a:solidFill>
-                    <a:srgbClr val="ffffff"/>
-                  </a:solidFill>
-                </a:uFill>
-                <a:latin typeface="Arial"/>
-              </a:rPr>
-              <a:t>a</a:t>
-            </a:r>
-            <a:r>
-              <a:rPr b="0" lang="pt-BR" sz="4400" spc="-1" strike="noStrike">
-                <a:solidFill>
-                  <a:srgbClr val="000000"/>
-                </a:solidFill>
-                <a:uFill>
-                  <a:solidFill>
-                    <a:srgbClr val="ffffff"/>
-                  </a:solidFill>
-                </a:uFill>
-                <a:latin typeface="Arial"/>
-              </a:rPr>
-              <a:t> </a:t>
-            </a:r>
-            <a:r>
-              <a:rPr b="0" lang="pt-BR" sz="4400" spc="-1" strike="noStrike">
-                <a:solidFill>
-                  <a:srgbClr val="000000"/>
-                </a:solidFill>
-                <a:uFill>
-                  <a:solidFill>
-                    <a:srgbClr val="ffffff"/>
-                  </a:solidFill>
-                </a:uFill>
-                <a:latin typeface="Arial"/>
-              </a:rPr>
-              <a:t>e</a:t>
-            </a:r>
-            <a:r>
-              <a:rPr b="0" lang="pt-BR" sz="4400" spc="-1" strike="noStrike">
-                <a:solidFill>
-                  <a:srgbClr val="000000"/>
-                </a:solidFill>
-                <a:uFill>
-                  <a:solidFill>
-                    <a:srgbClr val="ffffff"/>
-                  </a:solidFill>
-                </a:uFill>
-                <a:latin typeface="Arial"/>
-              </a:rPr>
-              <a:t>d</a:t>
-            </a:r>
-            <a:r>
-              <a:rPr b="0" lang="pt-BR" sz="4400" spc="-1" strike="noStrike">
-                <a:solidFill>
-                  <a:srgbClr val="000000"/>
-                </a:solidFill>
-                <a:uFill>
-                  <a:solidFill>
-                    <a:srgbClr val="ffffff"/>
-                  </a:solidFill>
-                </a:uFill>
-                <a:latin typeface="Arial"/>
-              </a:rPr>
-              <a:t>i</a:t>
-            </a:r>
-            <a:r>
-              <a:rPr b="0" lang="pt-BR" sz="4400" spc="-1" strike="noStrike">
-                <a:solidFill>
-                  <a:srgbClr val="000000"/>
-                </a:solidFill>
-                <a:uFill>
-                  <a:solidFill>
-                    <a:srgbClr val="ffffff"/>
-                  </a:solidFill>
-                </a:uFill>
-                <a:latin typeface="Arial"/>
-              </a:rPr>
-              <a:t>t</a:t>
-            </a:r>
-            <a:r>
-              <a:rPr b="0" lang="pt-BR" sz="4400" spc="-1" strike="noStrike">
-                <a:solidFill>
-                  <a:srgbClr val="000000"/>
-                </a:solidFill>
-                <a:uFill>
-                  <a:solidFill>
-                    <a:srgbClr val="ffffff"/>
-                  </a:solidFill>
-                </a:uFill>
-                <a:latin typeface="Arial"/>
-              </a:rPr>
-              <a:t>a</a:t>
-            </a:r>
-            <a:r>
-              <a:rPr b="0" lang="pt-BR" sz="4400" spc="-1" strike="noStrike">
-                <a:solidFill>
-                  <a:srgbClr val="000000"/>
-                </a:solidFill>
-                <a:uFill>
-                  <a:solidFill>
-                    <a:srgbClr val="ffffff"/>
-                  </a:solidFill>
-                </a:uFill>
-                <a:latin typeface="Arial"/>
-              </a:rPr>
-              <a:t>r </a:t>
-            </a:r>
-            <a:r>
-              <a:rPr b="0" lang="pt-BR" sz="4400" spc="-1" strike="noStrike">
-                <a:solidFill>
-                  <a:srgbClr val="000000"/>
-                </a:solidFill>
-                <a:uFill>
-                  <a:solidFill>
-                    <a:srgbClr val="ffffff"/>
-                  </a:solidFill>
-                </a:uFill>
-                <a:latin typeface="Arial"/>
-              </a:rPr>
-              <a:t>o</a:t>
-            </a:r>
-            <a:r>
-              <a:rPr b="0" lang="pt-BR" sz="4400" spc="-1" strike="noStrike">
-                <a:solidFill>
-                  <a:srgbClr val="000000"/>
-                </a:solidFill>
-                <a:uFill>
-                  <a:solidFill>
-                    <a:srgbClr val="ffffff"/>
-                  </a:solidFill>
-                </a:uFill>
-                <a:latin typeface="Arial"/>
-              </a:rPr>
-              <a:t> </a:t>
-            </a:r>
-            <a:r>
-              <a:rPr b="0" lang="pt-BR" sz="4400" spc="-1" strike="noStrike">
-                <a:solidFill>
-                  <a:srgbClr val="000000"/>
-                </a:solidFill>
-                <a:uFill>
-                  <a:solidFill>
-                    <a:srgbClr val="ffffff"/>
-                  </a:solidFill>
-                </a:uFill>
-                <a:latin typeface="Arial"/>
-              </a:rPr>
-              <a:t>f</a:t>
-            </a:r>
-            <a:r>
-              <a:rPr b="0" lang="pt-BR" sz="4400" spc="-1" strike="noStrike">
-                <a:solidFill>
-                  <a:srgbClr val="000000"/>
-                </a:solidFill>
-                <a:uFill>
-                  <a:solidFill>
-                    <a:srgbClr val="ffffff"/>
-                  </a:solidFill>
-                </a:uFill>
-                <a:latin typeface="Arial"/>
-              </a:rPr>
-              <a:t>o</a:t>
-            </a:r>
-            <a:r>
-              <a:rPr b="0" lang="pt-BR" sz="4400" spc="-1" strike="noStrike">
-                <a:solidFill>
-                  <a:srgbClr val="000000"/>
-                </a:solidFill>
-                <a:uFill>
-                  <a:solidFill>
-                    <a:srgbClr val="ffffff"/>
-                  </a:solidFill>
-                </a:uFill>
-                <a:latin typeface="Arial"/>
-              </a:rPr>
-              <a:t>r</a:t>
-            </a:r>
-            <a:r>
-              <a:rPr b="0" lang="pt-BR" sz="4400" spc="-1" strike="noStrike">
-                <a:solidFill>
-                  <a:srgbClr val="000000"/>
-                </a:solidFill>
-                <a:uFill>
-                  <a:solidFill>
-                    <a:srgbClr val="ffffff"/>
-                  </a:solidFill>
-                </a:uFill>
-                <a:latin typeface="Arial"/>
-              </a:rPr>
-              <a:t>m</a:t>
-            </a:r>
-            <a:r>
-              <a:rPr b="0" lang="pt-BR" sz="4400" spc="-1" strike="noStrike">
-                <a:solidFill>
-                  <a:srgbClr val="000000"/>
-                </a:solidFill>
-                <a:uFill>
-                  <a:solidFill>
-                    <a:srgbClr val="ffffff"/>
-                  </a:solidFill>
-                </a:uFill>
-                <a:latin typeface="Arial"/>
-              </a:rPr>
-              <a:t>a</a:t>
-            </a:r>
-            <a:r>
-              <a:rPr b="0" lang="pt-BR" sz="4400" spc="-1" strike="noStrike">
-                <a:solidFill>
-                  <a:srgbClr val="000000"/>
-                </a:solidFill>
-                <a:uFill>
-                  <a:solidFill>
-                    <a:srgbClr val="ffffff"/>
-                  </a:solidFill>
-                </a:uFill>
-                <a:latin typeface="Arial"/>
-              </a:rPr>
-              <a:t>t</a:t>
-            </a:r>
-            <a:r>
-              <a:rPr b="0" lang="pt-BR" sz="4400" spc="-1" strike="noStrike">
-                <a:solidFill>
-                  <a:srgbClr val="000000"/>
-                </a:solidFill>
-                <a:uFill>
-                  <a:solidFill>
-                    <a:srgbClr val="ffffff"/>
-                  </a:solidFill>
-                </a:uFill>
-                <a:latin typeface="Arial"/>
-              </a:rPr>
-              <a:t>o</a:t>
-            </a:r>
-            <a:r>
-              <a:rPr b="0" lang="pt-BR" sz="4400" spc="-1" strike="noStrike">
-                <a:solidFill>
-                  <a:srgbClr val="000000"/>
-                </a:solidFill>
-                <a:uFill>
-                  <a:solidFill>
-                    <a:srgbClr val="ffffff"/>
-                  </a:solidFill>
-                </a:uFill>
-                <a:latin typeface="Arial"/>
-              </a:rPr>
-              <a:t> </a:t>
-            </a:r>
-            <a:r>
-              <a:rPr b="0" lang="pt-BR" sz="4400" spc="-1" strike="noStrike">
-                <a:solidFill>
-                  <a:srgbClr val="000000"/>
-                </a:solidFill>
-                <a:uFill>
-                  <a:solidFill>
-                    <a:srgbClr val="ffffff"/>
-                  </a:solidFill>
-                </a:uFill>
-                <a:latin typeface="Arial"/>
-              </a:rPr>
-              <a:t>d</a:t>
-            </a:r>
-            <a:r>
-              <a:rPr b="0" lang="pt-BR" sz="4400" spc="-1" strike="noStrike">
-                <a:solidFill>
-                  <a:srgbClr val="000000"/>
-                </a:solidFill>
-                <a:uFill>
-                  <a:solidFill>
-                    <a:srgbClr val="ffffff"/>
-                  </a:solidFill>
-                </a:uFill>
-                <a:latin typeface="Arial"/>
-              </a:rPr>
-              <a:t>o</a:t>
-            </a:r>
-            <a:r>
-              <a:rPr b="0" lang="pt-BR" sz="4400" spc="-1" strike="noStrike">
-                <a:solidFill>
-                  <a:srgbClr val="000000"/>
-                </a:solidFill>
-                <a:uFill>
-                  <a:solidFill>
-                    <a:srgbClr val="ffffff"/>
-                  </a:solidFill>
-                </a:uFill>
-                <a:latin typeface="Arial"/>
-              </a:rPr>
-              <a:t> </a:t>
-            </a:r>
-            <a:r>
-              <a:rPr b="0" lang="pt-BR" sz="4400" spc="-1" strike="noStrike">
-                <a:solidFill>
-                  <a:srgbClr val="000000"/>
-                </a:solidFill>
-                <a:uFill>
-                  <a:solidFill>
-                    <a:srgbClr val="ffffff"/>
-                  </a:solidFill>
-                </a:uFill>
-                <a:latin typeface="Arial"/>
-              </a:rPr>
-              <a:t>t</a:t>
-            </a:r>
-            <a:r>
-              <a:rPr b="0" lang="pt-BR" sz="4400" spc="-1" strike="noStrike">
-                <a:solidFill>
-                  <a:srgbClr val="000000"/>
-                </a:solidFill>
-                <a:uFill>
-                  <a:solidFill>
-                    <a:srgbClr val="ffffff"/>
-                  </a:solidFill>
-                </a:uFill>
-                <a:latin typeface="Arial"/>
-              </a:rPr>
-              <a:t>e</a:t>
-            </a:r>
-            <a:r>
-              <a:rPr b="0" lang="pt-BR" sz="4400" spc="-1" strike="noStrike">
-                <a:solidFill>
-                  <a:srgbClr val="000000"/>
-                </a:solidFill>
-                <a:uFill>
-                  <a:solidFill>
-                    <a:srgbClr val="ffffff"/>
-                  </a:solidFill>
-                </a:uFill>
-                <a:latin typeface="Arial"/>
-              </a:rPr>
-              <a:t>x</a:t>
-            </a:r>
-            <a:r>
-              <a:rPr b="0" lang="pt-BR" sz="4400" spc="-1" strike="noStrike">
-                <a:solidFill>
-                  <a:srgbClr val="000000"/>
-                </a:solidFill>
-                <a:uFill>
-                  <a:solidFill>
-                    <a:srgbClr val="ffffff"/>
-                  </a:solidFill>
-                </a:uFill>
-                <a:latin typeface="Arial"/>
-              </a:rPr>
-              <a:t>t</a:t>
-            </a:r>
-            <a:r>
-              <a:rPr b="0" lang="pt-BR" sz="4400" spc="-1" strike="noStrike">
-                <a:solidFill>
-                  <a:srgbClr val="000000"/>
-                </a:solidFill>
-                <a:uFill>
-                  <a:solidFill>
-                    <a:srgbClr val="ffffff"/>
-                  </a:solidFill>
-                </a:uFill>
-                <a:latin typeface="Arial"/>
-              </a:rPr>
-              <a:t>o</a:t>
-            </a:r>
-            <a:r>
-              <a:rPr b="0" lang="pt-BR" sz="4400" spc="-1" strike="noStrike">
-                <a:solidFill>
-                  <a:srgbClr val="000000"/>
-                </a:solidFill>
-                <a:uFill>
-                  <a:solidFill>
-                    <a:srgbClr val="ffffff"/>
-                  </a:solidFill>
-                </a:uFill>
-                <a:latin typeface="Arial"/>
-              </a:rPr>
-              <a:t> </a:t>
-            </a:r>
-            <a:r>
-              <a:rPr b="0" lang="pt-BR" sz="4400" spc="-1" strike="noStrike">
-                <a:solidFill>
-                  <a:srgbClr val="000000"/>
-                </a:solidFill>
-                <a:uFill>
-                  <a:solidFill>
-                    <a:srgbClr val="ffffff"/>
-                  </a:solidFill>
-                </a:uFill>
-                <a:latin typeface="Arial"/>
-              </a:rPr>
-              <a:t>d</a:t>
-            </a:r>
-            <a:r>
-              <a:rPr b="0" lang="pt-BR" sz="4400" spc="-1" strike="noStrike">
-                <a:solidFill>
-                  <a:srgbClr val="000000"/>
-                </a:solidFill>
-                <a:uFill>
-                  <a:solidFill>
-                    <a:srgbClr val="ffffff"/>
-                  </a:solidFill>
-                </a:uFill>
-                <a:latin typeface="Arial"/>
-              </a:rPr>
-              <a:t>o</a:t>
-            </a:r>
-            <a:r>
-              <a:rPr b="0" lang="pt-BR" sz="4400" spc="-1" strike="noStrike">
-                <a:solidFill>
-                  <a:srgbClr val="000000"/>
-                </a:solidFill>
-                <a:uFill>
-                  <a:solidFill>
-                    <a:srgbClr val="ffffff"/>
-                  </a:solidFill>
-                </a:uFill>
-                <a:latin typeface="Arial"/>
-              </a:rPr>
-              <a:t> </a:t>
-            </a:r>
-            <a:r>
-              <a:rPr b="0" lang="pt-BR" sz="4400" spc="-1" strike="noStrike">
-                <a:solidFill>
-                  <a:srgbClr val="000000"/>
-                </a:solidFill>
-                <a:uFill>
-                  <a:solidFill>
-                    <a:srgbClr val="ffffff"/>
-                  </a:solidFill>
-                </a:uFill>
-                <a:latin typeface="Arial"/>
-              </a:rPr>
-              <a:t>t</a:t>
-            </a:r>
-            <a:r>
-              <a:rPr b="0" lang="pt-BR" sz="4400" spc="-1" strike="noStrike">
-                <a:solidFill>
-                  <a:srgbClr val="000000"/>
-                </a:solidFill>
-                <a:uFill>
-                  <a:solidFill>
-                    <a:srgbClr val="ffffff"/>
-                  </a:solidFill>
-                </a:uFill>
-                <a:latin typeface="Arial"/>
-              </a:rPr>
-              <a:t>í</a:t>
-            </a:r>
-            <a:r>
-              <a:rPr b="0" lang="pt-BR" sz="4400" spc="-1" strike="noStrike">
-                <a:solidFill>
-                  <a:srgbClr val="000000"/>
-                </a:solidFill>
-                <a:uFill>
-                  <a:solidFill>
-                    <a:srgbClr val="ffffff"/>
-                  </a:solidFill>
-                </a:uFill>
-                <a:latin typeface="Arial"/>
-              </a:rPr>
-              <a:t>t</a:t>
-            </a:r>
-            <a:r>
-              <a:rPr b="0" lang="pt-BR" sz="4400" spc="-1" strike="noStrike">
-                <a:solidFill>
-                  <a:srgbClr val="000000"/>
-                </a:solidFill>
-                <a:uFill>
-                  <a:solidFill>
-                    <a:srgbClr val="ffffff"/>
-                  </a:solidFill>
-                </a:uFill>
-                <a:latin typeface="Arial"/>
-              </a:rPr>
-              <a:t>u</a:t>
-            </a:r>
-            <a:r>
-              <a:rPr b="0" lang="pt-BR" sz="4400" spc="-1" strike="noStrike">
-                <a:solidFill>
-                  <a:srgbClr val="000000"/>
-                </a:solidFill>
-                <a:uFill>
-                  <a:solidFill>
-                    <a:srgbClr val="ffffff"/>
-                  </a:solidFill>
-                </a:uFill>
-                <a:latin typeface="Arial"/>
-              </a:rPr>
-              <a:t>l</a:t>
-            </a:r>
-            <a:r>
-              <a:rPr b="0" lang="pt-BR" sz="4400" spc="-1" strike="noStrike">
-                <a:solidFill>
-                  <a:srgbClr val="000000"/>
-                </a:solidFill>
-                <a:uFill>
-                  <a:solidFill>
-                    <a:srgbClr val="ffffff"/>
-                  </a:solidFill>
-                </a:uFill>
-                <a:latin typeface="Arial"/>
-              </a:rPr>
-              <a:t>o</a:t>
+              <a:t>Clique para editar o formato do texto do título</a:t>
             </a:r>
             <a:endParaRPr b="0" lang="pt-BR" sz="4400" spc="-1" strike="noStrike">
               <a:solidFill>
@@ -5497,637 +4867,7 @@
                 </a:uFill>
                 <a:latin typeface="Arial"/>
               </a:rPr>
-              <a:t>C</a:t>
-            </a:r>
-            <a:r>
-              <a:rPr b="0" lang="pt-BR" sz="4400" spc="-1" strike="noStrike">
-                <a:solidFill>
-                  <a:srgbClr val="000000"/>
-                </a:solidFill>
-                <a:uFill>
-                  <a:solidFill>
-                    <a:srgbClr val="ffffff"/>
-                  </a:solidFill>
-                </a:uFill>
-                <a:latin typeface="Arial"/>
-              </a:rPr>
-              <a:t>l</a:t>
-            </a:r>
-            <a:r>
-              <a:rPr b="0" lang="pt-BR" sz="4400" spc="-1" strike="noStrike">
-                <a:solidFill>
-                  <a:srgbClr val="000000"/>
-                </a:solidFill>
-                <a:uFill>
-                  <a:solidFill>
-                    <a:srgbClr val="ffffff"/>
-                  </a:solidFill>
-                </a:uFill>
-                <a:latin typeface="Arial"/>
-              </a:rPr>
-              <a:t>i</a:t>
-            </a:r>
-            <a:r>
-              <a:rPr b="0" lang="pt-BR" sz="4400" spc="-1" strike="noStrike">
-                <a:solidFill>
-                  <a:srgbClr val="000000"/>
-                </a:solidFill>
-                <a:uFill>
-                  <a:solidFill>
-                    <a:srgbClr val="ffffff"/>
-                  </a:solidFill>
-                </a:uFill>
-                <a:latin typeface="Arial"/>
-              </a:rPr>
-              <a:t>q</a:t>
-            </a:r>
-            <a:r>
-              <a:rPr b="0" lang="pt-BR" sz="4400" spc="-1" strike="noStrike">
-                <a:solidFill>
-                  <a:srgbClr val="000000"/>
-                </a:solidFill>
-                <a:uFill>
-                  <a:solidFill>
-                    <a:srgbClr val="ffffff"/>
-                  </a:solidFill>
-                </a:uFill>
-                <a:latin typeface="Arial"/>
-              </a:rPr>
-              <a:t>u</a:t>
-            </a:r>
-            <a:r>
-              <a:rPr b="0" lang="pt-BR" sz="4400" spc="-1" strike="noStrike">
-                <a:solidFill>
-                  <a:srgbClr val="000000"/>
-                </a:solidFill>
-                <a:uFill>
-                  <a:solidFill>
-                    <a:srgbClr val="ffffff"/>
-                  </a:solidFill>
-                </a:uFill>
-                <a:latin typeface="Arial"/>
-              </a:rPr>
-              <a:t>e</a:t>
-            </a:r>
-            <a:r>
-              <a:rPr b="0" lang="pt-BR" sz="4400" spc="-1" strike="noStrike">
-                <a:solidFill>
-                  <a:srgbClr val="000000"/>
-                </a:solidFill>
-                <a:uFill>
-                  <a:solidFill>
-                    <a:srgbClr val="ffffff"/>
-                  </a:solidFill>
-                </a:uFill>
-                <a:latin typeface="Arial"/>
-              </a:rPr>
-              <a:t> </a:t>
-            </a:r>
-            <a:r>
-              <a:rPr b="0" lang="pt-BR" sz="4400" spc="-1" strike="noStrike">
-                <a:solidFill>
-                  <a:srgbClr val="000000"/>
-                </a:solidFill>
-                <a:uFill>
-                  <a:solidFill>
-                    <a:srgbClr val="ffffff"/>
-                  </a:solidFill>
-                </a:uFill>
-                <a:latin typeface="Arial"/>
-              </a:rPr>
-              <a:t>p</a:t>
-            </a:r>
-            <a:r>
-              <a:rPr b="0" lang="pt-BR" sz="4400" spc="-1" strike="noStrike">
-                <a:solidFill>
-                  <a:srgbClr val="000000"/>
-                </a:solidFill>
-                <a:uFill>
-                  <a:solidFill>
-                    <a:srgbClr val="ffffff"/>
-                  </a:solidFill>
-                </a:uFill>
-                <a:latin typeface="Arial"/>
-              </a:rPr>
-              <a:t>a</a:t>
-            </a:r>
-            <a:r>
-              <a:rPr b="0" lang="pt-BR" sz="4400" spc="-1" strike="noStrike">
-                <a:solidFill>
-                  <a:srgbClr val="000000"/>
-                </a:solidFill>
-                <a:uFill>
-                  <a:solidFill>
-                    <a:srgbClr val="ffffff"/>
-                  </a:solidFill>
-                </a:uFill>
-                <a:latin typeface="Arial"/>
-              </a:rPr>
-              <a:t>r</a:t>
-            </a:r>
-            <a:r>
-              <a:rPr b="0" lang="pt-BR" sz="4400" spc="-1" strike="noStrike">
-                <a:solidFill>
-                  <a:srgbClr val="000000"/>
-                </a:solidFill>
-                <a:uFill>
-                  <a:solidFill>
-                    <a:srgbClr val="ffffff"/>
-                  </a:solidFill>
-                </a:uFill>
-                <a:latin typeface="Arial"/>
-              </a:rPr>
-              <a:t>a</a:t>
-            </a:r>
-            <a:r>
-              <a:rPr b="0" lang="pt-BR" sz="4400" spc="-1" strike="noStrike">
-                <a:solidFill>
-                  <a:srgbClr val="000000"/>
-                </a:solidFill>
-                <a:uFill>
-                  <a:solidFill>
-                    <a:srgbClr val="ffffff"/>
-                  </a:solidFill>
-                </a:uFill>
-                <a:latin typeface="Arial"/>
-              </a:rPr>
-              <a:t> </a:t>
-            </a:r>
-            <a:r>
-              <a:rPr b="0" lang="pt-BR" sz="4400" spc="-1" strike="noStrike">
-                <a:solidFill>
-                  <a:srgbClr val="000000"/>
-                </a:solidFill>
-                <a:uFill>
-                  <a:solidFill>
-                    <a:srgbClr val="ffffff"/>
-                  </a:solidFill>
-                </a:uFill>
-                <a:latin typeface="Arial"/>
-              </a:rPr>
-              <a:t>e</a:t>
-            </a:r>
-            <a:r>
-              <a:rPr b="0" lang="pt-BR" sz="4400" spc="-1" strike="noStrike">
-                <a:solidFill>
-                  <a:srgbClr val="000000"/>
-                </a:solidFill>
-                <a:uFill>
-                  <a:solidFill>
-                    <a:srgbClr val="ffffff"/>
-                  </a:solidFill>
-                </a:uFill>
-                <a:latin typeface="Arial"/>
-              </a:rPr>
-              <a:t>d</a:t>
-            </a:r>
-            <a:r>
-              <a:rPr b="0" lang="pt-BR" sz="4400" spc="-1" strike="noStrike">
-                <a:solidFill>
-                  <a:srgbClr val="000000"/>
-                </a:solidFill>
-                <a:uFill>
-                  <a:solidFill>
-                    <a:srgbClr val="ffffff"/>
-                  </a:solidFill>
-                </a:uFill>
-                <a:latin typeface="Arial"/>
-              </a:rPr>
-              <a:t>i</a:t>
-            </a:r>
-            <a:r>
-              <a:rPr b="0" lang="pt-BR" sz="4400" spc="-1" strike="noStrike">
-                <a:solidFill>
-                  <a:srgbClr val="000000"/>
-                </a:solidFill>
-                <a:uFill>
-                  <a:solidFill>
-                    <a:srgbClr val="ffffff"/>
-                  </a:solidFill>
-                </a:uFill>
-                <a:latin typeface="Arial"/>
-              </a:rPr>
-              <a:t>t</a:t>
-            </a:r>
-            <a:r>
-              <a:rPr b="0" lang="pt-BR" sz="4400" spc="-1" strike="noStrike">
-                <a:solidFill>
-                  <a:srgbClr val="000000"/>
-                </a:solidFill>
-                <a:uFill>
-                  <a:solidFill>
-                    <a:srgbClr val="ffffff"/>
-                  </a:solidFill>
-                </a:uFill>
-                <a:latin typeface="Arial"/>
-              </a:rPr>
-              <a:t>a</a:t>
-            </a:r>
-            <a:r>
-              <a:rPr b="0" lang="pt-BR" sz="4400" spc="-1" strike="noStrike">
-                <a:solidFill>
-                  <a:srgbClr val="000000"/>
-                </a:solidFill>
-                <a:uFill>
-                  <a:solidFill>
-                    <a:srgbClr val="ffffff"/>
-                  </a:solidFill>
-                </a:uFill>
-                <a:latin typeface="Arial"/>
-              </a:rPr>
-              <a:t>r </a:t>
-            </a:r>
-            <a:r>
-              <a:rPr b="0" lang="pt-BR" sz="4400" spc="-1" strike="noStrike">
-                <a:solidFill>
-                  <a:srgbClr val="000000"/>
-                </a:solidFill>
-                <a:uFill>
-                  <a:solidFill>
-                    <a:srgbClr val="ffffff"/>
-                  </a:solidFill>
-                </a:uFill>
-                <a:latin typeface="Arial"/>
-              </a:rPr>
-              <a:t>o</a:t>
-            </a:r>
-            <a:r>
-              <a:rPr b="0" lang="pt-BR" sz="4400" spc="-1" strike="noStrike">
-                <a:solidFill>
-                  <a:srgbClr val="000000"/>
-                </a:solidFill>
-                <a:uFill>
-                  <a:solidFill>
-                    <a:srgbClr val="ffffff"/>
-                  </a:solidFill>
-                </a:uFill>
-                <a:latin typeface="Arial"/>
-              </a:rPr>
-              <a:t> </a:t>
-            </a:r>
-            <a:r>
-              <a:rPr b="0" lang="pt-BR" sz="4400" spc="-1" strike="noStrike">
-                <a:solidFill>
-                  <a:srgbClr val="000000"/>
-                </a:solidFill>
-                <a:uFill>
-                  <a:solidFill>
-                    <a:srgbClr val="ffffff"/>
-                  </a:solidFill>
-                </a:uFill>
-                <a:latin typeface="Arial"/>
-              </a:rPr>
-              <a:t>f</a:t>
-            </a:r>
-            <a:r>
-              <a:rPr b="0" lang="pt-BR" sz="4400" spc="-1" strike="noStrike">
-                <a:solidFill>
-                  <a:srgbClr val="000000"/>
-                </a:solidFill>
-                <a:uFill>
-                  <a:solidFill>
-                    <a:srgbClr val="ffffff"/>
-                  </a:solidFill>
-                </a:uFill>
-                <a:latin typeface="Arial"/>
-              </a:rPr>
-              <a:t>o</a:t>
-            </a:r>
-            <a:r>
-              <a:rPr b="0" lang="pt-BR" sz="4400" spc="-1" strike="noStrike">
-                <a:solidFill>
-                  <a:srgbClr val="000000"/>
-                </a:solidFill>
-                <a:uFill>
-                  <a:solidFill>
-                    <a:srgbClr val="ffffff"/>
-                  </a:solidFill>
-                </a:uFill>
-                <a:latin typeface="Arial"/>
-              </a:rPr>
-              <a:t>r</a:t>
-            </a:r>
-            <a:r>
-              <a:rPr b="0" lang="pt-BR" sz="4400" spc="-1" strike="noStrike">
-                <a:solidFill>
-                  <a:srgbClr val="000000"/>
-                </a:solidFill>
-                <a:uFill>
-                  <a:solidFill>
-                    <a:srgbClr val="ffffff"/>
-                  </a:solidFill>
-                </a:uFill>
-                <a:latin typeface="Arial"/>
-              </a:rPr>
-              <a:t>m</a:t>
-            </a:r>
-            <a:r>
-              <a:rPr b="0" lang="pt-BR" sz="4400" spc="-1" strike="noStrike">
-                <a:solidFill>
-                  <a:srgbClr val="000000"/>
-                </a:solidFill>
-                <a:uFill>
-                  <a:solidFill>
-                    <a:srgbClr val="ffffff"/>
-                  </a:solidFill>
-                </a:uFill>
-                <a:latin typeface="Arial"/>
-              </a:rPr>
-              <a:t>a</a:t>
-            </a:r>
-            <a:r>
-              <a:rPr b="0" lang="pt-BR" sz="4400" spc="-1" strike="noStrike">
-                <a:solidFill>
-                  <a:srgbClr val="000000"/>
-                </a:solidFill>
-                <a:uFill>
-                  <a:solidFill>
-                    <a:srgbClr val="ffffff"/>
-                  </a:solidFill>
-                </a:uFill>
-                <a:latin typeface="Arial"/>
-              </a:rPr>
-              <a:t>t</a:t>
-            </a:r>
-            <a:r>
-              <a:rPr b="0" lang="pt-BR" sz="4400" spc="-1" strike="noStrike">
-                <a:solidFill>
-                  <a:srgbClr val="000000"/>
-                </a:solidFill>
-                <a:uFill>
-                  <a:solidFill>
-                    <a:srgbClr val="ffffff"/>
-                  </a:solidFill>
-                </a:uFill>
-                <a:latin typeface="Arial"/>
-              </a:rPr>
-              <a:t>o</a:t>
-            </a:r>
-            <a:r>
-              <a:rPr b="0" lang="pt-BR" sz="4400" spc="-1" strike="noStrike">
-                <a:solidFill>
-                  <a:srgbClr val="000000"/>
-                </a:solidFill>
-                <a:uFill>
-                  <a:solidFill>
-                    <a:srgbClr val="ffffff"/>
-                  </a:solidFill>
-                </a:uFill>
-                <a:latin typeface="Arial"/>
-              </a:rPr>
-              <a:t> </a:t>
-            </a:r>
-            <a:r>
-              <a:rPr b="0" lang="pt-BR" sz="4400" spc="-1" strike="noStrike">
-                <a:solidFill>
-                  <a:srgbClr val="000000"/>
-                </a:solidFill>
-                <a:uFill>
-                  <a:solidFill>
-                    <a:srgbClr val="ffffff"/>
-                  </a:solidFill>
-                </a:uFill>
-                <a:latin typeface="Arial"/>
-              </a:rPr>
-              <a:t>d</a:t>
-            </a:r>
-            <a:r>
-              <a:rPr b="0" lang="pt-BR" sz="4400" spc="-1" strike="noStrike">
-                <a:solidFill>
-                  <a:srgbClr val="000000"/>
-                </a:solidFill>
-                <a:uFill>
-                  <a:solidFill>
-                    <a:srgbClr val="ffffff"/>
-                  </a:solidFill>
-                </a:uFill>
-                <a:latin typeface="Arial"/>
-              </a:rPr>
-              <a:t>o</a:t>
-            </a:r>
-            <a:r>
-              <a:rPr b="0" lang="pt-BR" sz="4400" spc="-1" strike="noStrike">
-                <a:solidFill>
-                  <a:srgbClr val="000000"/>
-                </a:solidFill>
-                <a:uFill>
-                  <a:solidFill>
-                    <a:srgbClr val="ffffff"/>
-                  </a:solidFill>
-                </a:uFill>
-                <a:latin typeface="Arial"/>
-              </a:rPr>
-              <a:t> </a:t>
-            </a:r>
-            <a:r>
-              <a:rPr b="0" lang="pt-BR" sz="4400" spc="-1" strike="noStrike">
-                <a:solidFill>
-                  <a:srgbClr val="000000"/>
-                </a:solidFill>
-                <a:uFill>
-                  <a:solidFill>
-                    <a:srgbClr val="ffffff"/>
-                  </a:solidFill>
-                </a:uFill>
-                <a:latin typeface="Arial"/>
-              </a:rPr>
-              <a:t>t</a:t>
-            </a:r>
-            <a:r>
-              <a:rPr b="0" lang="pt-BR" sz="4400" spc="-1" strike="noStrike">
-                <a:solidFill>
-                  <a:srgbClr val="000000"/>
-                </a:solidFill>
-                <a:uFill>
-                  <a:solidFill>
-                    <a:srgbClr val="ffffff"/>
-                  </a:solidFill>
-                </a:uFill>
-                <a:latin typeface="Arial"/>
-              </a:rPr>
-              <a:t>e</a:t>
-            </a:r>
-            <a:r>
-              <a:rPr b="0" lang="pt-BR" sz="4400" spc="-1" strike="noStrike">
-                <a:solidFill>
-                  <a:srgbClr val="000000"/>
-                </a:solidFill>
-                <a:uFill>
-                  <a:solidFill>
-                    <a:srgbClr val="ffffff"/>
-                  </a:solidFill>
-                </a:uFill>
-                <a:latin typeface="Arial"/>
-              </a:rPr>
-              <a:t>x</a:t>
-            </a:r>
-            <a:r>
-              <a:rPr b="0" lang="pt-BR" sz="4400" spc="-1" strike="noStrike">
-                <a:solidFill>
-                  <a:srgbClr val="000000"/>
-                </a:solidFill>
-                <a:uFill>
-                  <a:solidFill>
-                    <a:srgbClr val="ffffff"/>
-                  </a:solidFill>
-                </a:uFill>
-                <a:latin typeface="Arial"/>
-              </a:rPr>
-              <a:t>t</a:t>
-            </a:r>
-            <a:r>
-              <a:rPr b="0" lang="pt-BR" sz="4400" spc="-1" strike="noStrike">
-                <a:solidFill>
-                  <a:srgbClr val="000000"/>
-                </a:solidFill>
-                <a:uFill>
-                  <a:solidFill>
-                    <a:srgbClr val="ffffff"/>
-                  </a:solidFill>
-                </a:uFill>
-                <a:latin typeface="Arial"/>
-              </a:rPr>
-              <a:t>o</a:t>
-            </a:r>
-            <a:r>
-              <a:rPr b="0" lang="pt-BR" sz="4400" spc="-1" strike="noStrike">
-                <a:solidFill>
-                  <a:srgbClr val="000000"/>
-                </a:solidFill>
-                <a:uFill>
-                  <a:solidFill>
-                    <a:srgbClr val="ffffff"/>
-                  </a:solidFill>
-                </a:uFill>
-                <a:latin typeface="Arial"/>
-              </a:rPr>
-              <a:t> </a:t>
-            </a:r>
-            <a:r>
-              <a:rPr b="0" lang="pt-BR" sz="4400" spc="-1" strike="noStrike">
-                <a:solidFill>
-                  <a:srgbClr val="000000"/>
-                </a:solidFill>
-                <a:uFill>
-                  <a:solidFill>
-                    <a:srgbClr val="ffffff"/>
-                  </a:solidFill>
-                </a:uFill>
-                <a:latin typeface="Arial"/>
-              </a:rPr>
-              <a:t>d</a:t>
-            </a:r>
-            <a:r>
-              <a:rPr b="0" lang="pt-BR" sz="4400" spc="-1" strike="noStrike">
-                <a:solidFill>
-                  <a:srgbClr val="000000"/>
-                </a:solidFill>
-                <a:uFill>
-                  <a:solidFill>
-                    <a:srgbClr val="ffffff"/>
-                  </a:solidFill>
-                </a:uFill>
-                <a:latin typeface="Arial"/>
-              </a:rPr>
-              <a:t>o</a:t>
-            </a:r>
-            <a:r>
-              <a:rPr b="0" lang="pt-BR" sz="4400" spc="-1" strike="noStrike">
-                <a:solidFill>
-                  <a:srgbClr val="000000"/>
-                </a:solidFill>
-                <a:uFill>
-                  <a:solidFill>
-                    <a:srgbClr val="ffffff"/>
-                  </a:solidFill>
-                </a:uFill>
-                <a:latin typeface="Arial"/>
-              </a:rPr>
-              <a:t> </a:t>
-            </a:r>
-            <a:r>
-              <a:rPr b="0" lang="pt-BR" sz="4400" spc="-1" strike="noStrike">
-                <a:solidFill>
-                  <a:srgbClr val="000000"/>
-                </a:solidFill>
-                <a:uFill>
-                  <a:solidFill>
-                    <a:srgbClr val="ffffff"/>
-                  </a:solidFill>
-                </a:uFill>
-                <a:latin typeface="Arial"/>
-              </a:rPr>
-              <a:t>t</a:t>
-            </a:r>
-            <a:r>
-              <a:rPr b="0" lang="pt-BR" sz="4400" spc="-1" strike="noStrike">
-                <a:solidFill>
-                  <a:srgbClr val="000000"/>
-                </a:solidFill>
-                <a:uFill>
-                  <a:solidFill>
-                    <a:srgbClr val="ffffff"/>
-                  </a:solidFill>
-                </a:uFill>
-                <a:latin typeface="Arial"/>
-              </a:rPr>
-              <a:t>í</a:t>
-            </a:r>
-            <a:r>
-              <a:rPr b="0" lang="pt-BR" sz="4400" spc="-1" strike="noStrike">
-                <a:solidFill>
-                  <a:srgbClr val="000000"/>
-                </a:solidFill>
-                <a:uFill>
-                  <a:solidFill>
-                    <a:srgbClr val="ffffff"/>
-                  </a:solidFill>
-                </a:uFill>
-                <a:latin typeface="Arial"/>
-              </a:rPr>
-              <a:t>t</a:t>
-            </a:r>
-            <a:r>
-              <a:rPr b="0" lang="pt-BR" sz="4400" spc="-1" strike="noStrike">
-                <a:solidFill>
-                  <a:srgbClr val="000000"/>
-                </a:solidFill>
-                <a:uFill>
-                  <a:solidFill>
-                    <a:srgbClr val="ffffff"/>
-                  </a:solidFill>
-                </a:uFill>
-                <a:latin typeface="Arial"/>
-              </a:rPr>
-              <a:t>u</a:t>
-            </a:r>
-            <a:r>
-              <a:rPr b="0" lang="pt-BR" sz="4400" spc="-1" strike="noStrike">
-                <a:solidFill>
-                  <a:srgbClr val="000000"/>
-                </a:solidFill>
-                <a:uFill>
-                  <a:solidFill>
-                    <a:srgbClr val="ffffff"/>
-                  </a:solidFill>
-                </a:uFill>
-                <a:latin typeface="Arial"/>
-              </a:rPr>
-              <a:t>l</a:t>
-            </a:r>
-            <a:r>
-              <a:rPr b="0" lang="pt-BR" sz="4400" spc="-1" strike="noStrike">
-                <a:solidFill>
-                  <a:srgbClr val="000000"/>
-                </a:solidFill>
-                <a:uFill>
-                  <a:solidFill>
-                    <a:srgbClr val="ffffff"/>
-                  </a:solidFill>
-                </a:uFill>
-                <a:latin typeface="Arial"/>
-              </a:rPr>
-              <a:t>o</a:t>
+              <a:t>Clique para editar o formato do texto do título</a:t>
             </a:r>
             <a:endParaRPr b="0" lang="pt-BR" sz="4400" spc="-1" strike="noStrike">
               <a:solidFill>
@@ -6820,7 +5560,7 @@
         <p:spPr>
           <a:xfrm>
             <a:off x="685800" y="2130480"/>
-            <a:ext cx="7770600" cy="1468080"/>
+            <a:ext cx="7770240" cy="1467720"/>
           </a:xfrm>
           <a:prstGeom prst="rect">
             <a:avLst/>
@@ -6910,7 +5650,7 @@
         <p:spPr>
           <a:xfrm>
             <a:off x="1371600" y="3886200"/>
-            <a:ext cx="6399000" cy="1750680"/>
+            <a:ext cx="6398640" cy="1750320"/>
           </a:xfrm>
           <a:prstGeom prst="rect">
             <a:avLst/>
@@ -7021,7 +5761,7 @@
         <p:spPr>
           <a:xfrm>
             <a:off x="457200" y="274680"/>
-            <a:ext cx="8227800" cy="1141200"/>
+            <a:ext cx="8227440" cy="1140840"/>
           </a:xfrm>
           <a:prstGeom prst="rect">
             <a:avLst/>
@@ -9072,7 +7812,7 @@
         <p:spPr>
           <a:xfrm>
             <a:off x="457200" y="274680"/>
-            <a:ext cx="8227800" cy="1141200"/>
+            <a:ext cx="8227440" cy="1140840"/>
           </a:xfrm>
           <a:prstGeom prst="rect">
             <a:avLst/>
@@ -9134,7 +7874,7 @@
         <p:spPr>
           <a:xfrm>
             <a:off x="457200" y="1600200"/>
-            <a:ext cx="8227800" cy="4524120"/>
+            <a:ext cx="8227440" cy="4523760"/>
           </a:xfrm>
           <a:prstGeom prst="rect">
             <a:avLst/>
@@ -9153,7 +7893,7 @@
         <p:txBody>
           <a:bodyPr lIns="90000" rIns="90000" tIns="45000" bIns="45000"/>
           <a:p>
-            <a:pPr marL="343080" indent="-341280">
+            <a:pPr marL="343080" indent="-340920">
               <a:lnSpc>
                 <a:spcPct val="100000"/>
               </a:lnSpc>
@@ -9191,7 +7931,7 @@
             </a:endParaRPr>
           </a:p>
           <a:p>
-            <a:pPr marL="343080" indent="-341280">
+            <a:pPr marL="343080" indent="-340920">
               <a:lnSpc>
                 <a:spcPct val="100000"/>
               </a:lnSpc>
@@ -9229,7 +7969,7 @@
             </a:endParaRPr>
           </a:p>
           <a:p>
-            <a:pPr marL="343080" indent="-341280">
+            <a:pPr marL="343080" indent="-340920">
               <a:lnSpc>
                 <a:spcPct val="100000"/>
               </a:lnSpc>
@@ -9267,7 +8007,7 @@
             </a:endParaRPr>
           </a:p>
           <a:p>
-            <a:pPr marL="343080" indent="-341280">
+            <a:pPr marL="343080" indent="-340920">
               <a:lnSpc>
                 <a:spcPct val="100000"/>
               </a:lnSpc>
@@ -9305,7 +8045,7 @@
             </a:endParaRPr>
           </a:p>
           <a:p>
-            <a:pPr marL="343080" indent="-341280">
+            <a:pPr marL="343080" indent="-340920">
               <a:lnSpc>
                 <a:spcPct val="100000"/>
               </a:lnSpc>
@@ -9343,7 +8083,7 @@
             </a:endParaRPr>
           </a:p>
           <a:p>
-            <a:pPr marL="343080" indent="-341280">
+            <a:pPr marL="343080" indent="-340920">
               <a:lnSpc>
                 <a:spcPct val="100000"/>
               </a:lnSpc>
@@ -9381,7 +8121,7 @@
             </a:endParaRPr>
           </a:p>
           <a:p>
-            <a:pPr marL="343080" indent="-341280">
+            <a:pPr marL="343080" indent="-340920">
               <a:lnSpc>
                 <a:spcPct val="100000"/>
               </a:lnSpc>
@@ -9496,7 +8236,7 @@
         <p:spPr>
           <a:xfrm>
             <a:off x="457200" y="274680"/>
-            <a:ext cx="8227800" cy="1141200"/>
+            <a:ext cx="8227440" cy="1140840"/>
           </a:xfrm>
           <a:prstGeom prst="rect">
             <a:avLst/>
@@ -9558,7 +8298,7 @@
         <p:spPr>
           <a:xfrm>
             <a:off x="457200" y="1600200"/>
-            <a:ext cx="8227800" cy="4524120"/>
+            <a:ext cx="8227440" cy="4523760"/>
           </a:xfrm>
           <a:prstGeom prst="rect">
             <a:avLst/>
@@ -9669,7 +8409,7 @@
         <p:spPr>
           <a:xfrm>
             <a:off x="457200" y="274680"/>
-            <a:ext cx="8227800" cy="1141200"/>
+            <a:ext cx="8227440" cy="1140840"/>
           </a:xfrm>
           <a:prstGeom prst="rect">
             <a:avLst/>
@@ -10041,22 +8781,7 @@
                           <a:latin typeface="Arial"/>
                           <a:ea typeface="DejaVu Sans"/>
                         </a:rPr>
-                        <a:t>Lider do projeto, Desenvolvedor e </a:t>
-                      </a:r>
-                      <a:r>
-                        <a:rPr b="0" lang="pt-BR" sz="1800" spc="-1" strike="noStrike">
-                          <a:solidFill>
-                            <a:srgbClr val="000000"/>
-                          </a:solidFill>
-                          <a:uFill>
-                            <a:solidFill>
-                              <a:srgbClr val="ffffff"/>
-                            </a:solidFill>
-                          </a:uFill>
-                          <a:latin typeface="Arial"/>
-                          <a:ea typeface="DejaVu Sans"/>
-                        </a:rPr>
-                        <a:t>Gerente de configuração  </a:t>
+                        <a:t>Lider do projeto, Desenvolvedor e Gerente de configuração  </a:t>
                       </a:r>
                       <a:endParaRPr b="0" lang="pt-BR" sz="1800" spc="-1" strike="noStrike">
                         <a:solidFill>
@@ -10223,7 +8948,7 @@
         <p:spPr>
           <a:xfrm>
             <a:off x="457200" y="274680"/>
-            <a:ext cx="8227800" cy="1141200"/>
+            <a:ext cx="8227440" cy="1140840"/>
           </a:xfrm>
           <a:prstGeom prst="rect">
             <a:avLst/>
@@ -11312,7 +10037,7 @@
         <p:spPr>
           <a:xfrm>
             <a:off x="457200" y="274680"/>
-            <a:ext cx="8227800" cy="1141200"/>
+            <a:ext cx="8227440" cy="1140840"/>
           </a:xfrm>
           <a:prstGeom prst="rect">
             <a:avLst/>
@@ -11373,17 +10098,18 @@
         </p:nvGraphicFramePr>
         <p:xfrm>
           <a:off x="563400" y="1297080"/>
-          <a:ext cx="8313840" cy="4239360"/>
+          <a:ext cx="8076600" cy="4649400"/>
         </p:xfrm>
         <a:graphic>
           <a:graphicData uri="http://schemas.openxmlformats.org/drawingml/2006/table">
             <a:tbl>
               <a:tblPr/>
               <a:tblGrid>
-                <a:gridCol w="340200"/>
-                <a:gridCol w="4180680"/>
-                <a:gridCol w="2144160"/>
-                <a:gridCol w="1649160"/>
+                <a:gridCol w="377640"/>
+                <a:gridCol w="3776040"/>
+                <a:gridCol w="1204560"/>
+                <a:gridCol w="1493640"/>
+                <a:gridCol w="1493640"/>
               </a:tblGrid>
               <a:tr h="383040">
                 <a:tc>
@@ -11579,13 +10305,8 @@
                   <a:txBody>
                     <a:bodyPr/>
                     <a:p>
-                      <a:pPr>
-                        <a:lnSpc>
-                          <a:spcPct val="100000"/>
-                        </a:lnSpc>
-                      </a:pPr>
                       <a:r>
-                        <a:rPr b="1" lang="pt-BR" sz="1800" spc="-1" strike="noStrike">
+                        <a:rPr b="0" lang="pt-BR" sz="2400" spc="-1" strike="noStrike">
                           <a:solidFill>
                             <a:srgbClr val="000000"/>
                           </a:solidFill>
@@ -11594,12 +10315,137 @@
                               <a:srgbClr val="ffffff"/>
                             </a:solidFill>
                           </a:uFill>
-                          <a:latin typeface="Arial"/>
-                          <a:ea typeface="DejaVu Sans"/>
+                          <a:latin typeface="Times New Roman"/>
                         </a:rPr>
-                        <a:t>Release</a:t>
+                        <a:t>E</a:t>
                       </a:r>
-                      <a:endParaRPr b="0" lang="pt-BR" sz="1800" spc="-1" strike="noStrike">
+                      <a:r>
+                        <a:rPr b="0" lang="pt-BR" sz="2400" spc="-1" strike="noStrike">
+                          <a:solidFill>
+                            <a:srgbClr val="000000"/>
+                          </a:solidFill>
+                          <a:uFill>
+                            <a:solidFill>
+                              <a:srgbClr val="ffffff"/>
+                            </a:solidFill>
+                          </a:uFill>
+                          <a:latin typeface="Times New Roman"/>
+                        </a:rPr>
+                        <a:t>s</a:t>
+                      </a:r>
+                      <a:r>
+                        <a:rPr b="0" lang="pt-BR" sz="2400" spc="-1" strike="noStrike">
+                          <a:solidFill>
+                            <a:srgbClr val="000000"/>
+                          </a:solidFill>
+                          <a:uFill>
+                            <a:solidFill>
+                              <a:srgbClr val="ffffff"/>
+                            </a:solidFill>
+                          </a:uFill>
+                          <a:latin typeface="Times New Roman"/>
+                        </a:rPr>
+                        <a:t>t</a:t>
+                      </a:r>
+                      <a:r>
+                        <a:rPr b="0" lang="pt-BR" sz="2400" spc="-1" strike="noStrike">
+                          <a:solidFill>
+                            <a:srgbClr val="000000"/>
+                          </a:solidFill>
+                          <a:uFill>
+                            <a:solidFill>
+                              <a:srgbClr val="ffffff"/>
+                            </a:solidFill>
+                          </a:uFill>
+                          <a:latin typeface="Times New Roman"/>
+                        </a:rPr>
+                        <a:t>i</a:t>
+                      </a:r>
+                      <a:r>
+                        <a:rPr b="0" lang="pt-BR" sz="2400" spc="-1" strike="noStrike">
+                          <a:solidFill>
+                            <a:srgbClr val="000000"/>
+                          </a:solidFill>
+                          <a:uFill>
+                            <a:solidFill>
+                              <a:srgbClr val="ffffff"/>
+                            </a:solidFill>
+                          </a:uFill>
+                          <a:latin typeface="Times New Roman"/>
+                        </a:rPr>
+                        <a:t>m</a:t>
+                      </a:r>
+                      <a:r>
+                        <a:rPr b="0" lang="pt-BR" sz="2400" spc="-1" strike="noStrike">
+                          <a:solidFill>
+                            <a:srgbClr val="000000"/>
+                          </a:solidFill>
+                          <a:uFill>
+                            <a:solidFill>
+                              <a:srgbClr val="ffffff"/>
+                            </a:solidFill>
+                          </a:uFill>
+                          <a:latin typeface="Times New Roman"/>
+                        </a:rPr>
+                        <a:t>a</a:t>
+                      </a:r>
+                      <a:r>
+                        <a:rPr b="0" lang="pt-BR" sz="2400" spc="-1" strike="noStrike">
+                          <a:solidFill>
+                            <a:srgbClr val="000000"/>
+                          </a:solidFill>
+                          <a:uFill>
+                            <a:solidFill>
+                              <a:srgbClr val="ffffff"/>
+                            </a:solidFill>
+                          </a:uFill>
+                          <a:latin typeface="Times New Roman"/>
+                        </a:rPr>
+                        <a:t>t</a:t>
+                      </a:r>
+                      <a:r>
+                        <a:rPr b="0" lang="pt-BR" sz="2400" spc="-1" strike="noStrike">
+                          <a:solidFill>
+                            <a:srgbClr val="000000"/>
+                          </a:solidFill>
+                          <a:uFill>
+                            <a:solidFill>
+                              <a:srgbClr val="ffffff"/>
+                            </a:solidFill>
+                          </a:uFill>
+                          <a:latin typeface="Times New Roman"/>
+                        </a:rPr>
+                        <a:t>i</a:t>
+                      </a:r>
+                      <a:r>
+                        <a:rPr b="0" lang="pt-BR" sz="2400" spc="-1" strike="noStrike">
+                          <a:solidFill>
+                            <a:srgbClr val="000000"/>
+                          </a:solidFill>
+                          <a:uFill>
+                            <a:solidFill>
+                              <a:srgbClr val="ffffff"/>
+                            </a:solidFill>
+                          </a:uFill>
+                          <a:latin typeface="Times New Roman"/>
+                        </a:rPr>
+                        <a:t>v</a:t>
+                      </a:r>
+                      <a:r>
+                        <a:rPr b="0" lang="pt-BR" sz="2400" spc="-1" strike="noStrike">
+                          <a:solidFill>
+                            <a:srgbClr val="000000"/>
+                          </a:solidFill>
+                          <a:uFill>
+                            <a:solidFill>
+                              <a:srgbClr val="ffffff"/>
+                            </a:solidFill>
+                          </a:uFill>
+                          <a:latin typeface="Times New Roman"/>
+                        </a:rPr>
+                        <a:t>a</a:t>
+                      </a:r>
+                      <a:endParaRPr b="0" lang="pt-BR" sz="2400" spc="-1" strike="noStrike">
                         <a:solidFill>
                           <a:srgbClr val="000000"/>
                         </a:solidFill>
@@ -11608,7 +10454,64 @@
                             <a:srgbClr val="ffffff"/>
                           </a:solidFill>
                         </a:uFill>
-                        <a:latin typeface="Arial"/>
+                        <a:latin typeface="Times New Roman"/>
+                      </a:endParaRPr>
+                    </a:p>
+                  </a:txBody>
+                  <a:tcPr marL="91440" marR="91440">
+                    <a:lnL w="12240">
+                      <a:solidFill>
+                        <a:srgbClr val="ffffff"/>
+                      </a:solidFill>
+                    </a:lnL>
+                    <a:lnR w="12240">
+                      <a:solidFill>
+                        <a:srgbClr val="ffffff"/>
+                      </a:solidFill>
+                    </a:lnR>
+                    <a:lnT w="12240">
+                      <a:solidFill>
+                        <a:srgbClr val="ffffff"/>
+                      </a:solidFill>
+                    </a:lnT>
+                    <a:lnB w="38160">
+                      <a:solidFill>
+                        <a:srgbClr val="ffffff"/>
+                      </a:solidFill>
+                    </a:lnB>
+                    <a:solidFill>
+                      <a:srgbClr val="4f81bd"/>
+                    </a:solidFill>
+                  </a:tcPr>
+                </a:tc>
+                <a:tc>
+                  <a:txBody>
+                    <a:bodyPr/>
+                    <a:p>
+                      <a:r>
+                        <a:rPr b="0" lang="pt-BR" sz="2400" spc="-1" strike="noStrike">
+                          <a:solidFill>
+                            <a:srgbClr val="000000"/>
+                          </a:solidFill>
+                          <a:uFill>
+                            <a:solidFill>
+                              <a:srgbClr val="ffffff"/>
+                            </a:solidFill>
+                          </a:uFill>
+                          <a:latin typeface="Times New Roman"/>
+                        </a:rPr>
+                        <a:t>Release</a:t>
+                      </a:r>
+                      <a:endParaRPr b="0" lang="pt-BR" sz="2400" spc="-1" strike="noStrike">
+                        <a:solidFill>
+                          <a:srgbClr val="000000"/>
+                        </a:solidFill>
+                        <a:uFill>
+                          <a:solidFill>
+                            <a:srgbClr val="ffffff"/>
+                          </a:solidFill>
+                        </a:uFill>
+                        <a:latin typeface="Times New Roman"/>
                       </a:endParaRPr>
                     </a:p>
                   </a:txBody>
@@ -11725,7 +10628,7 @@
                           <a:latin typeface="Arial"/>
                           <a:ea typeface="Arial Narrow"/>
                         </a:rPr>
-                        <a:t>Gerenciamento de Ativos de Hardware</a:t>
+                        <a:t>Gerenciamento de Ativos </a:t>
                       </a:r>
                       <a:endParaRPr b="0" lang="pt-BR" sz="1800" spc="-1" strike="noStrike">
                         <a:solidFill>
@@ -11829,7 +10732,264 @@
                     </a:solidFill>
                   </a:tcPr>
                 </a:tc>
-                <a:tc rowSpan="3">
+                <a:tc>
+                  <a:txBody>
+                    <a:bodyPr/>
+                    <a:p>
+                      <a:r>
+                        <a:rPr b="0" lang="pt-BR" sz="2400" spc="-1" strike="noStrike">
+                          <a:solidFill>
+                            <a:srgbClr val="000000"/>
+                          </a:solidFill>
+                          <a:uFill>
+                            <a:solidFill>
+                              <a:srgbClr val="ffffff"/>
+                            </a:solidFill>
+                          </a:uFill>
+                          <a:latin typeface="Times New Roman"/>
+                        </a:rPr>
+                        <a:t>8</a:t>
+                      </a:r>
+                      <a:endParaRPr b="0" lang="pt-BR" sz="2400" spc="-1" strike="noStrike">
+                        <a:solidFill>
+                          <a:srgbClr val="000000"/>
+                        </a:solidFill>
+                        <a:uFill>
+                          <a:solidFill>
+                            <a:srgbClr val="ffffff"/>
+                          </a:solidFill>
+                        </a:uFill>
+                        <a:latin typeface="Times New Roman"/>
+                      </a:endParaRPr>
+                    </a:p>
+                  </a:txBody>
+                  <a:tcPr marL="91440" marR="91440">
+                    <a:lnL w="12240">
+                      <a:solidFill>
+                        <a:srgbClr val="ffffff"/>
+                      </a:solidFill>
+                    </a:lnL>
+                    <a:lnR w="12240">
+                      <a:solidFill>
+                        <a:srgbClr val="ffffff"/>
+                      </a:solidFill>
+                    </a:lnR>
+                    <a:lnT w="12240">
+                      <a:solidFill>
+                        <a:srgbClr val="ffffff"/>
+                      </a:solidFill>
+                    </a:lnT>
+                    <a:lnB w="12240">
+                      <a:solidFill>
+                        <a:srgbClr val="ffffff"/>
+                      </a:solidFill>
+                    </a:lnB>
+                    <a:solidFill>
+                      <a:srgbClr val="d0d8e7"/>
+                    </a:solidFill>
+                  </a:tcPr>
+                </a:tc>
+                <a:tc rowSpan="2">
+                  <a:txBody>
+                    <a:bodyPr/>
+                    <a:p>
+                      <a:r>
+                        <a:rPr b="0" lang="pt-BR" sz="2400" spc="-1" strike="noStrike">
+                          <a:solidFill>
+                            <a:srgbClr val="000000"/>
+                          </a:solidFill>
+                          <a:uFill>
+                            <a:solidFill>
+                              <a:srgbClr val="ffffff"/>
+                            </a:solidFill>
+                          </a:uFill>
+                          <a:latin typeface="Times New Roman"/>
+                        </a:rPr>
+                        <a:t>1</a:t>
+                      </a:r>
+                      <a:endParaRPr b="0" lang="pt-BR" sz="2400" spc="-1" strike="noStrike">
+                        <a:solidFill>
+                          <a:srgbClr val="000000"/>
+                        </a:solidFill>
+                        <a:uFill>
+                          <a:solidFill>
+                            <a:srgbClr val="ffffff"/>
+                          </a:solidFill>
+                        </a:uFill>
+                        <a:latin typeface="Times New Roman"/>
+                      </a:endParaRPr>
+                    </a:p>
+                  </a:txBody>
+                  <a:tcPr marL="91440" marR="91440">
+                    <a:lnL w="12240">
+                      <a:solidFill>
+                        <a:srgbClr val="ffffff"/>
+                      </a:solidFill>
+                    </a:lnL>
+                    <a:lnR w="12240">
+                      <a:solidFill>
+                        <a:srgbClr val="ffffff"/>
+                      </a:solidFill>
+                    </a:lnR>
+                    <a:lnT w="12240">
+                      <a:solidFill>
+                        <a:srgbClr val="ffffff"/>
+                      </a:solidFill>
+                    </a:lnT>
+                    <a:lnB w="12240">
+                      <a:solidFill>
+                        <a:srgbClr val="ffffff"/>
+                      </a:solidFill>
+                    </a:lnB>
+                    <a:solidFill>
+                      <a:srgbClr val="d0d8e7"/>
+                    </a:solidFill>
+                  </a:tcPr>
+                </a:tc>
+              </a:tr>
+              <a:tr h="383040">
+                <a:tc>
+                  <a:txBody>
+                    <a:bodyPr/>
+                    <a:p>
+                      <a:pPr>
+                        <a:lnSpc>
+                          <a:spcPct val="100000"/>
+                        </a:lnSpc>
+                      </a:pPr>
+                      <a:r>
+                        <a:rPr b="0" lang="pt-BR" sz="1200" spc="-1" strike="noStrike">
+                          <a:solidFill>
+                            <a:srgbClr val="000000"/>
+                          </a:solidFill>
+                          <a:uFill>
+                            <a:solidFill>
+                              <a:srgbClr val="ffffff"/>
+                            </a:solidFill>
+                          </a:uFill>
+                          <a:latin typeface="Arial"/>
+                          <a:ea typeface="DejaVu Sans"/>
+                        </a:rPr>
+                        <a:t>4</a:t>
+                      </a:r>
+                      <a:endParaRPr b="0" lang="pt-BR" sz="1800" spc="-1" strike="noStrike">
+                        <a:solidFill>
+                          <a:srgbClr val="000000"/>
+                        </a:solidFill>
+                        <a:uFill>
+                          <a:solidFill>
+                            <a:srgbClr val="ffffff"/>
+                          </a:solidFill>
+                        </a:uFill>
+                        <a:latin typeface="Arial"/>
+                      </a:endParaRPr>
+                    </a:p>
+                  </a:txBody>
+                  <a:tcPr marL="91440" marR="91440">
+                    <a:lnL w="12240">
+                      <a:solidFill>
+                        <a:srgbClr val="ffffff"/>
+                      </a:solidFill>
+                    </a:lnL>
+                    <a:lnR w="12240">
+                      <a:solidFill>
+                        <a:srgbClr val="ffffff"/>
+                      </a:solidFill>
+                    </a:lnR>
+                    <a:lnT w="12240">
+                      <a:solidFill>
+                        <a:srgbClr val="ffffff"/>
+                      </a:solidFill>
+                    </a:lnT>
+                    <a:lnB w="12240">
+                      <a:solidFill>
+                        <a:srgbClr val="ffffff"/>
+                      </a:solidFill>
+                    </a:lnB>
+                    <a:solidFill>
+                      <a:srgbClr val="e9ecf3"/>
+                    </a:solidFill>
+                  </a:tcPr>
+                </a:tc>
+                <a:tc>
+                  <a:txBody>
+                    <a:bodyPr/>
+                    <a:p>
+                      <a:pPr>
+                        <a:lnSpc>
+                          <a:spcPct val="100000"/>
+                        </a:lnSpc>
+                      </a:pPr>
+                      <a:r>
+                        <a:rPr b="0" lang="pt-BR" sz="1000" spc="-1" strike="noStrike">
+                          <a:solidFill>
+                            <a:srgbClr val="000000"/>
+                          </a:solidFill>
+                          <a:uFill>
+                            <a:solidFill>
+                              <a:srgbClr val="ffffff"/>
+                            </a:solidFill>
+                          </a:uFill>
+                          <a:latin typeface="Arial"/>
+                          <a:ea typeface="DejaVu Sans"/>
+                        </a:rPr>
+                        <a:t> </a:t>
+                      </a:r>
+                      <a:r>
+                        <a:rPr b="0" lang="pt-BR" sz="1000" spc="-1" strike="noStrike">
+                          <a:solidFill>
+                            <a:srgbClr val="000000"/>
+                          </a:solidFill>
+                          <a:uFill>
+                            <a:solidFill>
+                              <a:srgbClr val="ffffff"/>
+                            </a:solidFill>
+                          </a:uFill>
+                          <a:latin typeface="Arial"/>
+                          <a:ea typeface="DejaVu Sans"/>
+                        </a:rPr>
+                        <a:t>Gerenciar fornecedores</a:t>
+                      </a:r>
+                      <a:endParaRPr b="0" lang="pt-BR" sz="1800" spc="-1" strike="noStrike">
+                        <a:solidFill>
+                          <a:srgbClr val="000000"/>
+                        </a:solidFill>
+                        <a:uFill>
+                          <a:solidFill>
+                            <a:srgbClr val="ffffff"/>
+                          </a:solidFill>
+                        </a:uFill>
+                        <a:latin typeface="Arial"/>
+                      </a:endParaRPr>
+                    </a:p>
+                  </a:txBody>
+                  <a:tcPr marL="91440" marR="91440">
+                    <a:lnL w="12240">
+                      <a:solidFill>
+                        <a:srgbClr val="ffffff"/>
+                      </a:solidFill>
+                    </a:lnL>
+                    <a:lnR w="12240">
+                      <a:solidFill>
+                        <a:srgbClr val="ffffff"/>
+                      </a:solidFill>
+                    </a:lnR>
+                    <a:lnT w="12240">
+                      <a:solidFill>
+                        <a:srgbClr val="ffffff"/>
+                      </a:solidFill>
+                    </a:lnT>
+                    <a:lnB w="12240">
+                      <a:solidFill>
+                        <a:srgbClr val="ffffff"/>
+                      </a:solidFill>
+                    </a:lnB>
+                    <a:solidFill>
+                      <a:srgbClr val="e9ecf3"/>
+                    </a:solidFill>
+                  </a:tcPr>
+                </a:tc>
+                <a:tc>
                   <a:txBody>
                     <a:bodyPr/>
                     <a:p>
@@ -11839,7 +10999,128 @@
                         </a:lnSpc>
                       </a:pPr>
                       <a:r>
-                        <a:rPr b="0" lang="pt-BR" sz="1800" spc="-1" strike="noStrike">
+                        <a:rPr b="0" lang="pt-BR" sz="2000" spc="-1" strike="noStrike">
+                          <a:solidFill>
+                            <a:srgbClr val="000000"/>
+                          </a:solidFill>
+                          <a:uFill>
+                            <a:solidFill>
+                              <a:srgbClr val="ffffff"/>
+                            </a:solidFill>
+                          </a:uFill>
+                          <a:latin typeface="Times New Roman"/>
+                        </a:rPr>
+                        <a:t>1</a:t>
+                      </a:r>
+                      <a:endParaRPr b="0" lang="pt-BR" sz="1800" spc="-1" strike="noStrike">
+                        <a:solidFill>
+                          <a:srgbClr val="000000"/>
+                        </a:solidFill>
+                        <a:uFill>
+                          <a:solidFill>
+                            <a:srgbClr val="ffffff"/>
+                          </a:solidFill>
+                        </a:uFill>
+                        <a:latin typeface="Arial"/>
+                      </a:endParaRPr>
+                    </a:p>
+                  </a:txBody>
+                  <a:tcPr marL="91440" marR="91440">
+                    <a:lnL w="12240">
+                      <a:solidFill>
+                        <a:srgbClr val="ffffff"/>
+                      </a:solidFill>
+                    </a:lnL>
+                    <a:lnR w="12240">
+                      <a:solidFill>
+                        <a:srgbClr val="ffffff"/>
+                      </a:solidFill>
+                    </a:lnR>
+                    <a:lnT w="12240">
+                      <a:solidFill>
+                        <a:srgbClr val="ffffff"/>
+                      </a:solidFill>
+                    </a:lnT>
+                    <a:lnB w="12240">
+                      <a:solidFill>
+                        <a:srgbClr val="ffffff"/>
+                      </a:solidFill>
+                    </a:lnB>
+                    <a:solidFill>
+                      <a:srgbClr val="e9ecf3"/>
+                    </a:solidFill>
+                  </a:tcPr>
+                </a:tc>
+                <a:tc>
+                  <a:txBody>
+                    <a:bodyPr/>
+                    <a:p>
+                      <a:r>
+                        <a:rPr b="0" lang="pt-BR" sz="2400" spc="-1" strike="noStrike">
+                          <a:solidFill>
+                            <a:srgbClr val="000000"/>
+                          </a:solidFill>
+                          <a:uFill>
+                            <a:solidFill>
+                              <a:srgbClr val="ffffff"/>
+                            </a:solidFill>
+                          </a:uFill>
+                          <a:latin typeface="Times New Roman"/>
+                        </a:rPr>
+                        <a:t>1</a:t>
+                      </a:r>
+                      <a:endParaRPr b="0" lang="pt-BR" sz="2400" spc="-1" strike="noStrike">
+                        <a:solidFill>
+                          <a:srgbClr val="000000"/>
+                        </a:solidFill>
+                        <a:uFill>
+                          <a:solidFill>
+                            <a:srgbClr val="ffffff"/>
+                          </a:solidFill>
+                        </a:uFill>
+                        <a:latin typeface="Times New Roman"/>
+                      </a:endParaRPr>
+                    </a:p>
+                  </a:txBody>
+                  <a:tcPr marL="91440" marR="91440">
+                    <a:lnL w="12240">
+                      <a:solidFill>
+                        <a:srgbClr val="ffffff"/>
+                      </a:solidFill>
+                    </a:lnL>
+                    <a:lnR w="12240">
+                      <a:solidFill>
+                        <a:srgbClr val="ffffff"/>
+                      </a:solidFill>
+                    </a:lnR>
+                    <a:lnT w="12240">
+                      <a:solidFill>
+                        <a:srgbClr val="ffffff"/>
+                      </a:solidFill>
+                    </a:lnT>
+                    <a:lnB w="12240">
+                      <a:solidFill>
+                        <a:srgbClr val="ffffff"/>
+                      </a:solidFill>
+                    </a:lnB>
+                    <a:solidFill>
+                      <a:srgbClr val="e9ecf3"/>
+                    </a:solidFill>
+                  </a:tcPr>
+                </a:tc>
+              </a:tr>
+              <a:tr h="383040">
+                <a:tc>
+                  <a:txBody>
+                    <a:bodyPr/>
+                    <a:p>
+                      <a:pPr>
+                        <a:lnSpc>
+                          <a:spcPct val="100000"/>
+                        </a:lnSpc>
+                      </a:pPr>
+                      <a:r>
+                        <a:rPr b="0" lang="pt-BR" sz="1200" spc="-1" strike="noStrike">
                           <a:solidFill>
                             <a:srgbClr val="000000"/>
                           </a:solidFill>
@@ -11851,7 +11132,7 @@
                           <a:latin typeface="Arial"/>
                           <a:ea typeface="DejaVu Sans"/>
                         </a:rPr>
-                        <a:t>1</a:t>
+                        <a:t>5</a:t>
                       </a:r>
                       <a:endParaRPr b="0" lang="pt-BR" sz="1800" spc="-1" strike="noStrike">
                         <a:solidFill>
@@ -11863,6 +11144,493 @@
                           </a:solidFill>
                         </a:uFill>
                         <a:latin typeface="Arial"/>
+                      </a:endParaRPr>
+                    </a:p>
+                  </a:txBody>
+                  <a:tcPr marL="91440" marR="91440">
+                    <a:lnL w="12240">
+                      <a:solidFill>
+                        <a:srgbClr val="ffffff"/>
+                      </a:solidFill>
+                    </a:lnL>
+                    <a:lnR w="12240">
+                      <a:solidFill>
+                        <a:srgbClr val="ffffff"/>
+                      </a:solidFill>
+                    </a:lnR>
+                    <a:lnT w="12240">
+                      <a:solidFill>
+                        <a:srgbClr val="ffffff"/>
+                      </a:solidFill>
+                    </a:lnT>
+                    <a:lnB w="12240">
+                      <a:solidFill>
+                        <a:srgbClr val="ffffff"/>
+                      </a:solidFill>
+                    </a:lnB>
+                    <a:solidFill>
+                      <a:srgbClr val="d0d8e7"/>
+                    </a:solidFill>
+                  </a:tcPr>
+                </a:tc>
+                <a:tc>
+                  <a:txBody>
+                    <a:bodyPr/>
+                    <a:p>
+                      <a:pPr>
+                        <a:lnSpc>
+                          <a:spcPct val="100000"/>
+                        </a:lnSpc>
+                      </a:pPr>
+                      <a:r>
+                        <a:rPr b="0" lang="pt-BR" sz="1000" spc="-1" strike="noStrike">
+                          <a:solidFill>
+                            <a:srgbClr val="000000"/>
+                          </a:solidFill>
+                          <a:uFill>
+                            <a:solidFill>
+                              <a:srgbClr val="ffffff"/>
+                            </a:solidFill>
+                          </a:uFill>
+                          <a:latin typeface="Arial"/>
+                          <a:ea typeface="DejaVu Sans"/>
+                        </a:rPr>
+                        <a:t>Gerenciar registro de cadastro nas portas biométricas</a:t>
+                      </a:r>
+                      <a:endParaRPr b="0" lang="pt-BR" sz="1800" spc="-1" strike="noStrike">
+                        <a:solidFill>
+                          <a:srgbClr val="000000"/>
+                        </a:solidFill>
+                        <a:uFill>
+                          <a:solidFill>
+                            <a:srgbClr val="ffffff"/>
+                          </a:solidFill>
+                        </a:uFill>
+                        <a:latin typeface="Arial"/>
+                      </a:endParaRPr>
+                    </a:p>
+                  </a:txBody>
+                  <a:tcPr marL="91440" marR="91440">
+                    <a:lnL w="12240">
+                      <a:solidFill>
+                        <a:srgbClr val="ffffff"/>
+                      </a:solidFill>
+                    </a:lnL>
+                    <a:lnR w="12240">
+                      <a:solidFill>
+                        <a:srgbClr val="ffffff"/>
+                      </a:solidFill>
+                    </a:lnR>
+                    <a:lnT w="12240">
+                      <a:solidFill>
+                        <a:srgbClr val="ffffff"/>
+                      </a:solidFill>
+                    </a:lnT>
+                    <a:lnB w="12240">
+                      <a:solidFill>
+                        <a:srgbClr val="ffffff"/>
+                      </a:solidFill>
+                    </a:lnB>
+                    <a:solidFill>
+                      <a:srgbClr val="d0d8e7"/>
+                    </a:solidFill>
+                  </a:tcPr>
+                </a:tc>
+                <a:tc>
+                  <a:txBody>
+                    <a:bodyPr/>
+                    <a:p>
+                      <a:pPr algn="ctr">
+                        <a:lnSpc>
+                          <a:spcPct val="100000"/>
+                        </a:lnSpc>
+                      </a:pPr>
+                      <a:r>
+                        <a:rPr b="0" lang="pt-BR" sz="2000" spc="-1" strike="noStrike">
+                          <a:solidFill>
+                            <a:srgbClr val="000000"/>
+                          </a:solidFill>
+                          <a:uFill>
+                            <a:solidFill>
+                              <a:srgbClr val="ffffff"/>
+                            </a:solidFill>
+                          </a:uFill>
+                          <a:latin typeface="Arial"/>
+                          <a:ea typeface="DejaVu Sans"/>
+                        </a:rPr>
+                        <a:t>2</a:t>
+                      </a:r>
+                      <a:endParaRPr b="0" lang="pt-BR" sz="1800" spc="-1" strike="noStrike">
+                        <a:solidFill>
+                          <a:srgbClr val="000000"/>
+                        </a:solidFill>
+                        <a:uFill>
+                          <a:solidFill>
+                            <a:srgbClr val="ffffff"/>
+                          </a:solidFill>
+                        </a:uFill>
+                        <a:latin typeface="Arial"/>
+                      </a:endParaRPr>
+                    </a:p>
+                  </a:txBody>
+                  <a:tcPr marL="91440" marR="91440">
+                    <a:lnL w="12240">
+                      <a:solidFill>
+                        <a:srgbClr val="ffffff"/>
+                      </a:solidFill>
+                    </a:lnL>
+                    <a:lnR w="12240">
+                      <a:solidFill>
+                        <a:srgbClr val="ffffff"/>
+                      </a:solidFill>
+                    </a:lnR>
+                    <a:lnT w="12240">
+                      <a:solidFill>
+                        <a:srgbClr val="ffffff"/>
+                      </a:solidFill>
+                    </a:lnT>
+                    <a:lnB w="12240">
+                      <a:solidFill>
+                        <a:srgbClr val="ffffff"/>
+                      </a:solidFill>
+                    </a:lnB>
+                    <a:solidFill>
+                      <a:srgbClr val="d0d8e7"/>
+                    </a:solidFill>
+                  </a:tcPr>
+                </a:tc>
+                <a:tc>
+                  <a:txBody>
+                    <a:bodyPr/>
+                    <a:p>
+                      <a:r>
+                        <a:rPr b="0" lang="pt-BR" sz="2400" spc="-1" strike="noStrike">
+                          <a:solidFill>
+                            <a:srgbClr val="000000"/>
+                          </a:solidFill>
+                          <a:uFill>
+                            <a:solidFill>
+                              <a:srgbClr val="ffffff"/>
+                            </a:solidFill>
+                          </a:uFill>
+                          <a:latin typeface="Times New Roman"/>
+                        </a:rPr>
+                        <a:t>2</a:t>
+                      </a:r>
+                      <a:endParaRPr b="0" lang="pt-BR" sz="2400" spc="-1" strike="noStrike">
+                        <a:solidFill>
+                          <a:srgbClr val="000000"/>
+                        </a:solidFill>
+                        <a:uFill>
+                          <a:solidFill>
+                            <a:srgbClr val="ffffff"/>
+                          </a:solidFill>
+                        </a:uFill>
+                        <a:latin typeface="Times New Roman"/>
+                      </a:endParaRPr>
+                    </a:p>
+                  </a:txBody>
+                  <a:tcPr marL="91440" marR="91440">
+                    <a:lnL w="12240">
+                      <a:solidFill>
+                        <a:srgbClr val="ffffff"/>
+                      </a:solidFill>
+                    </a:lnL>
+                    <a:lnR w="12240">
+                      <a:solidFill>
+                        <a:srgbClr val="ffffff"/>
+                      </a:solidFill>
+                    </a:lnR>
+                    <a:lnT w="12240">
+                      <a:solidFill>
+                        <a:srgbClr val="ffffff"/>
+                      </a:solidFill>
+                    </a:lnT>
+                    <a:lnB w="12240">
+                      <a:solidFill>
+                        <a:srgbClr val="ffffff"/>
+                      </a:solidFill>
+                    </a:lnB>
+                    <a:solidFill>
+                      <a:srgbClr val="d0d8e7"/>
+                    </a:solidFill>
+                  </a:tcPr>
+                </a:tc>
+                <a:tc rowSpan="2">
+                  <a:txBody>
+                    <a:bodyPr/>
+                    <a:p>
+                      <a:r>
+                        <a:rPr b="0" lang="pt-BR" sz="2400" spc="-1" strike="noStrike">
+                          <a:solidFill>
+                            <a:srgbClr val="000000"/>
+                          </a:solidFill>
+                          <a:uFill>
+                            <a:solidFill>
+                              <a:srgbClr val="ffffff"/>
+                            </a:solidFill>
+                          </a:uFill>
+                          <a:latin typeface="Times New Roman"/>
+                        </a:rPr>
+                        <a:t>2</a:t>
+                      </a:r>
+                      <a:endParaRPr b="0" lang="pt-BR" sz="2400" spc="-1" strike="noStrike">
+                        <a:solidFill>
+                          <a:srgbClr val="000000"/>
+                        </a:solidFill>
+                        <a:uFill>
+                          <a:solidFill>
+                            <a:srgbClr val="ffffff"/>
+                          </a:solidFill>
+                        </a:uFill>
+                        <a:latin typeface="Times New Roman"/>
+                      </a:endParaRPr>
+                    </a:p>
+                  </a:txBody>
+                  <a:tcPr marL="91440" marR="91440">
+                    <a:lnL w="12240">
+                      <a:solidFill>
+                        <a:srgbClr val="ffffff"/>
+                      </a:solidFill>
+                    </a:lnL>
+                    <a:lnR w="12240">
+                      <a:solidFill>
+                        <a:srgbClr val="ffffff"/>
+                      </a:solidFill>
+                    </a:lnR>
+                    <a:lnT w="12240">
+                      <a:solidFill>
+                        <a:srgbClr val="ffffff"/>
+                      </a:solidFill>
+                    </a:lnT>
+                    <a:lnB w="12240">
+                      <a:solidFill>
+                        <a:srgbClr val="ffffff"/>
+                      </a:solidFill>
+                    </a:lnB>
+                    <a:solidFill>
+                      <a:srgbClr val="d0d8e7"/>
+                    </a:solidFill>
+                  </a:tcPr>
+                </a:tc>
+              </a:tr>
+              <a:tr h="383040">
+                <a:tc>
+                  <a:txBody>
+                    <a:bodyPr/>
+                    <a:p>
+                      <a:pPr>
+                        <a:lnSpc>
+                          <a:spcPct val="100000"/>
+                        </a:lnSpc>
+                      </a:pPr>
+                      <a:r>
+                        <a:rPr b="0" lang="pt-BR" sz="1200" spc="-1" strike="noStrike">
+                          <a:solidFill>
+                            <a:srgbClr val="000000"/>
+                          </a:solidFill>
+                          <a:uFill>
+                            <a:solidFill>
+                              <a:srgbClr val="ffffff"/>
+                            </a:solidFill>
+                          </a:uFill>
+                          <a:latin typeface="Arial"/>
+                          <a:ea typeface="DejaVu Sans"/>
+                        </a:rPr>
+                        <a:t>7</a:t>
+                      </a:r>
+                      <a:endParaRPr b="0" lang="pt-BR" sz="1800" spc="-1" strike="noStrike">
+                        <a:solidFill>
+                          <a:srgbClr val="000000"/>
+                        </a:solidFill>
+                        <a:uFill>
+                          <a:solidFill>
+                            <a:srgbClr val="ffffff"/>
+                          </a:solidFill>
+                        </a:uFill>
+                        <a:latin typeface="Arial"/>
+                      </a:endParaRPr>
+                    </a:p>
+                  </a:txBody>
+                  <a:tcPr marL="91440" marR="91440">
+                    <a:lnL w="12240">
+                      <a:solidFill>
+                        <a:srgbClr val="ffffff"/>
+                      </a:solidFill>
+                    </a:lnL>
+                    <a:lnR w="12240">
+                      <a:solidFill>
+                        <a:srgbClr val="ffffff"/>
+                      </a:solidFill>
+                    </a:lnR>
+                    <a:lnT w="12240">
+                      <a:solidFill>
+                        <a:srgbClr val="ffffff"/>
+                      </a:solidFill>
+                    </a:lnT>
+                    <a:lnB w="12240">
+                      <a:solidFill>
+                        <a:srgbClr val="ffffff"/>
+                      </a:solidFill>
+                    </a:lnB>
+                    <a:solidFill>
+                      <a:srgbClr val="d0d8e7"/>
+                    </a:solidFill>
+                  </a:tcPr>
+                </a:tc>
+                <a:tc>
+                  <a:txBody>
+                    <a:bodyPr/>
+                    <a:p>
+                      <a:pPr>
+                        <a:lnSpc>
+                          <a:spcPct val="100000"/>
+                        </a:lnSpc>
+                      </a:pPr>
+                      <a:r>
+                        <a:rPr b="0" lang="pt-BR" sz="1000" spc="-1" strike="noStrike">
+                          <a:solidFill>
+                            <a:srgbClr val="000000"/>
+                          </a:solidFill>
+                          <a:uFill>
+                            <a:solidFill>
+                              <a:srgbClr val="ffffff"/>
+                            </a:solidFill>
+                          </a:uFill>
+                          <a:latin typeface="Arial"/>
+                          <a:ea typeface="DejaVu Sans"/>
+                        </a:rPr>
+                        <a:t>Gerenciamento de Materiais para Serviços de TI</a:t>
+                      </a:r>
+                      <a:endParaRPr b="0" lang="pt-BR" sz="1800" spc="-1" strike="noStrike">
+                        <a:solidFill>
+                          <a:srgbClr val="000000"/>
+                        </a:solidFill>
+                        <a:uFill>
+                          <a:solidFill>
+                            <a:srgbClr val="ffffff"/>
+                          </a:solidFill>
+                        </a:uFill>
+                        <a:latin typeface="Arial"/>
+                      </a:endParaRPr>
+                    </a:p>
+                  </a:txBody>
+                  <a:tcPr marL="91440" marR="91440">
+                    <a:lnL w="12240">
+                      <a:solidFill>
+                        <a:srgbClr val="ffffff"/>
+                      </a:solidFill>
+                    </a:lnL>
+                    <a:lnR w="12240">
+                      <a:solidFill>
+                        <a:srgbClr val="ffffff"/>
+                      </a:solidFill>
+                    </a:lnR>
+                    <a:lnT w="12240">
+                      <a:solidFill>
+                        <a:srgbClr val="ffffff"/>
+                      </a:solidFill>
+                    </a:lnT>
+                    <a:lnB w="12240">
+                      <a:solidFill>
+                        <a:srgbClr val="ffffff"/>
+                      </a:solidFill>
+                    </a:lnB>
+                    <a:solidFill>
+                      <a:srgbClr val="d0d8e7"/>
+                    </a:solidFill>
+                  </a:tcPr>
+                </a:tc>
+                <a:tc>
+                  <a:txBody>
+                    <a:bodyPr/>
+                    <a:p>
+                      <a:pPr algn="ctr">
+                        <a:lnSpc>
+                          <a:spcPct val="100000"/>
+                        </a:lnSpc>
+                      </a:pPr>
+                      <a:r>
+                        <a:rPr b="0" lang="pt-BR" sz="2000" spc="-1" strike="noStrike">
+                          <a:solidFill>
+                            <a:srgbClr val="000000"/>
+                          </a:solidFill>
+                          <a:uFill>
+                            <a:solidFill>
+                              <a:srgbClr val="ffffff"/>
+                            </a:solidFill>
+                          </a:uFill>
+                          <a:latin typeface="Times New Roman"/>
+                        </a:rPr>
+                        <a:t>2</a:t>
+                      </a:r>
+                      <a:endParaRPr b="0" lang="pt-BR" sz="1800" spc="-1" strike="noStrike">
+                        <a:solidFill>
+                          <a:srgbClr val="000000"/>
+                        </a:solidFill>
+                        <a:uFill>
+                          <a:solidFill>
+                            <a:srgbClr val="ffffff"/>
+                          </a:solidFill>
+                        </a:uFill>
+                        <a:latin typeface="Arial"/>
+                      </a:endParaRPr>
+                    </a:p>
+                  </a:txBody>
+                  <a:tcPr marL="91440" marR="91440">
+                    <a:lnL w="12240">
+                      <a:solidFill>
+                        <a:srgbClr val="ffffff"/>
+                      </a:solidFill>
+                    </a:lnL>
+                    <a:lnR w="12240">
+                      <a:solidFill>
+                        <a:srgbClr val="ffffff"/>
+                      </a:solidFill>
+                    </a:lnR>
+                    <a:lnT w="12240">
+                      <a:solidFill>
+                        <a:srgbClr val="ffffff"/>
+                      </a:solidFill>
+                    </a:lnT>
+                    <a:lnB w="12240">
+                      <a:solidFill>
+                        <a:srgbClr val="ffffff"/>
+                      </a:solidFill>
+                    </a:lnB>
+                    <a:solidFill>
+                      <a:srgbClr val="d0d8e7"/>
+                    </a:solidFill>
+                  </a:tcPr>
+                </a:tc>
+                <a:tc>
+                  <a:txBody>
+                    <a:bodyPr/>
+                    <a:p>
+                      <a:r>
+                        <a:rPr b="0" lang="pt-BR" sz="2400" spc="-1" strike="noStrike">
+                          <a:solidFill>
+                            <a:srgbClr val="000000"/>
+                          </a:solidFill>
+                          <a:uFill>
+                            <a:solidFill>
+                              <a:srgbClr val="ffffff"/>
+                            </a:solidFill>
+                          </a:uFill>
+                          <a:latin typeface="Times New Roman"/>
+                        </a:rPr>
+                        <a:t>3</a:t>
+                      </a:r>
+                      <a:endParaRPr b="0" lang="pt-BR" sz="2400" spc="-1" strike="noStrike">
+                        <a:solidFill>
+                          <a:srgbClr val="000000"/>
+                        </a:solidFill>
+                        <a:uFill>
+                          <a:solidFill>
+                            <a:srgbClr val="ffffff"/>
+                          </a:solidFill>
+                        </a:uFill>
+                        <a:latin typeface="Times New Roman"/>
                       </a:endParaRPr>
                     </a:p>
                   </a:txBody>
@@ -11916,7 +11684,7 @@
                           <a:latin typeface="Arial"/>
                           <a:ea typeface="Calibri"/>
                         </a:rPr>
-                        <a:t>2</a:t>
+                        <a:t>8</a:t>
                       </a:r>
                       <a:endParaRPr b="0" lang="pt-BR" sz="1800" spc="-1" strike="noStrike">
                         <a:solidFill>
@@ -11979,7 +11747,7 @@
                           <a:latin typeface="Arial"/>
                           <a:ea typeface="Arial Narrow"/>
                         </a:rPr>
-                        <a:t>Gerenciamento de Ativos de Software</a:t>
+                        <a:t>Gerir a Transferência de equipamentos e materiais</a:t>
                       </a:r>
                       <a:endParaRPr b="0" lang="pt-BR" sz="1800" spc="-1" strike="noStrike">
                         <a:solidFill>
@@ -12039,271 +11807,7 @@
                               <a:srgbClr val="ffffff"/>
                             </a:solidFill>
                           </a:uFill>
-                          <a:latin typeface="Arial"/>
-                          <a:ea typeface="DejaVu Sans"/>
-                        </a:rPr>
-                        <a:t>1</a:t>
-                      </a:r>
-                      <a:endParaRPr b="0" lang="pt-BR" sz="1800" spc="-1" strike="noStrike">
-                        <a:solidFill>
-                          <a:srgbClr val="000000"/>
-                        </a:solidFill>
-                        <a:uFill>
-                          <a:solidFill>
-                            <a:srgbClr val="ffffff"/>
-                          </a:solidFill>
-                        </a:uFill>
-                        <a:latin typeface="Arial"/>
-                      </a:endParaRPr>
-                    </a:p>
-                  </a:txBody>
-                  <a:tcPr marL="91440" marR="91440">
-                    <a:lnL w="12240">
-                      <a:solidFill>
-                        <a:srgbClr val="ffffff"/>
-                      </a:solidFill>
-                    </a:lnL>
-                    <a:lnR w="12240">
-                      <a:solidFill>
-                        <a:srgbClr val="ffffff"/>
-                      </a:solidFill>
-                    </a:lnR>
-                    <a:lnT w="12240">
-                      <a:solidFill>
-                        <a:srgbClr val="ffffff"/>
-                      </a:solidFill>
-                    </a:lnT>
-                    <a:lnB w="12240">
-                      <a:solidFill>
-                        <a:srgbClr val="ffffff"/>
-                      </a:solidFill>
-                    </a:lnB>
-                    <a:solidFill>
-                      <a:srgbClr val="e9ecf3"/>
-                    </a:solidFill>
-                  </a:tcPr>
-                </a:tc>
-                <a:tc vMerge="1">
-                  <a:tcPr>
-                    <a:solidFill>
-                      <a:srgbClr val="729fcf"/>
-                    </a:solidFill>
-                  </a:tcPr>
-                </a:tc>
-              </a:tr>
-              <a:tr h="409320">
-                <a:tc>
-                  <a:txBody>
-                    <a:bodyPr/>
-                    <a:p>
-                      <a:pPr>
-                        <a:lnSpc>
-                          <a:spcPct val="100000"/>
-                        </a:lnSpc>
-                      </a:pPr>
-                      <a:r>
-                        <a:rPr b="0" lang="pt-BR" sz="1200" spc="-1" strike="noStrike">
-                          <a:solidFill>
-                            <a:srgbClr val="000000"/>
-                          </a:solidFill>
-                          <a:uFill>
-                            <a:solidFill>
-                              <a:srgbClr val="ffffff"/>
-                            </a:solidFill>
-                          </a:uFill>
-                          <a:latin typeface="Arial"/>
-                          <a:ea typeface="DejaVu Sans"/>
-                        </a:rPr>
-                        <a:t>3</a:t>
-                      </a:r>
-                      <a:endParaRPr b="0" lang="pt-BR" sz="1800" spc="-1" strike="noStrike">
-                        <a:solidFill>
-                          <a:srgbClr val="000000"/>
-                        </a:solidFill>
-                        <a:uFill>
-                          <a:solidFill>
-                            <a:srgbClr val="ffffff"/>
-                          </a:solidFill>
-                        </a:uFill>
-                        <a:latin typeface="Arial"/>
-                      </a:endParaRPr>
-                    </a:p>
-                  </a:txBody>
-                  <a:tcPr marL="91440" marR="91440">
-                    <a:lnL w="12240">
-                      <a:solidFill>
-                        <a:srgbClr val="ffffff"/>
-                      </a:solidFill>
-                    </a:lnL>
-                    <a:lnR w="12240">
-                      <a:solidFill>
-                        <a:srgbClr val="ffffff"/>
-                      </a:solidFill>
-                    </a:lnR>
-                    <a:lnT w="12240">
-                      <a:solidFill>
-                        <a:srgbClr val="ffffff"/>
-                      </a:solidFill>
-                    </a:lnT>
-                    <a:lnB w="12240">
-                      <a:solidFill>
-                        <a:srgbClr val="ffffff"/>
-                      </a:solidFill>
-                    </a:lnB>
-                    <a:solidFill>
-                      <a:srgbClr val="d0d8e7"/>
-                    </a:solidFill>
-                  </a:tcPr>
-                </a:tc>
-                <a:tc>
-                  <a:txBody>
-                    <a:bodyPr/>
-                    <a:p>
-                      <a:pPr>
-                        <a:lnSpc>
-                          <a:spcPct val="100000"/>
-                        </a:lnSpc>
-                      </a:pPr>
-                      <a:r>
-                        <a:rPr b="0" lang="pt-BR" sz="1000" spc="-1" strike="noStrike">
-                          <a:solidFill>
-                            <a:srgbClr val="000000"/>
-                          </a:solidFill>
-                          <a:uFill>
-                            <a:solidFill>
-                              <a:srgbClr val="ffffff"/>
-                            </a:solidFill>
-                          </a:uFill>
-                          <a:latin typeface="Arial"/>
-                          <a:ea typeface="DejaVu Sans"/>
-                        </a:rPr>
-                        <a:t>Gerenciamento de Ativos de Rede</a:t>
-                      </a:r>
-                      <a:endParaRPr b="0" lang="pt-BR" sz="1800" spc="-1" strike="noStrike">
-                        <a:solidFill>
-                          <a:srgbClr val="000000"/>
-                        </a:solidFill>
-                        <a:uFill>
-                          <a:solidFill>
-                            <a:srgbClr val="ffffff"/>
-                          </a:solidFill>
-                        </a:uFill>
-                        <a:latin typeface="Arial"/>
-                      </a:endParaRPr>
-                    </a:p>
-                  </a:txBody>
-                  <a:tcPr marL="91440" marR="91440">
-                    <a:lnL w="12240">
-                      <a:solidFill>
-                        <a:srgbClr val="ffffff"/>
-                      </a:solidFill>
-                    </a:lnL>
-                    <a:lnR w="12240">
-                      <a:solidFill>
-                        <a:srgbClr val="ffffff"/>
-                      </a:solidFill>
-                    </a:lnR>
-                    <a:lnT w="12240">
-                      <a:solidFill>
-                        <a:srgbClr val="ffffff"/>
-                      </a:solidFill>
-                    </a:lnT>
-                    <a:lnB w="12240">
-                      <a:solidFill>
-                        <a:srgbClr val="ffffff"/>
-                      </a:solidFill>
-                    </a:lnB>
-                    <a:solidFill>
-                      <a:srgbClr val="d0d8e7"/>
-                    </a:solidFill>
-                  </a:tcPr>
-                </a:tc>
-                <a:tc>
-                  <a:txBody>
-                    <a:bodyPr/>
-                    <a:p>
-                      <a:pPr algn="ctr">
-                        <a:lnSpc>
-                          <a:spcPct val="100000"/>
-                        </a:lnSpc>
-                      </a:pPr>
-                      <a:r>
-                        <a:rPr b="0" lang="pt-BR" sz="2000" spc="-1" strike="noStrike">
-                          <a:solidFill>
-                            <a:srgbClr val="000000"/>
-                          </a:solidFill>
-                          <a:uFill>
-                            <a:solidFill>
-                              <a:srgbClr val="ffffff"/>
-                            </a:solidFill>
-                          </a:uFill>
-                          <a:latin typeface="Arial"/>
-                          <a:ea typeface="DejaVu Sans"/>
-                        </a:rPr>
-                        <a:t>1</a:t>
-                      </a:r>
-                      <a:endParaRPr b="0" lang="pt-BR" sz="1800" spc="-1" strike="noStrike">
-                        <a:solidFill>
-                          <a:srgbClr val="000000"/>
-                        </a:solidFill>
-                        <a:uFill>
-                          <a:solidFill>
-                            <a:srgbClr val="ffffff"/>
-                          </a:solidFill>
-                        </a:uFill>
-                        <a:latin typeface="Arial"/>
-                      </a:endParaRPr>
-                    </a:p>
-                  </a:txBody>
-                  <a:tcPr marL="91440" marR="91440">
-                    <a:lnL w="12240">
-                      <a:solidFill>
-                        <a:srgbClr val="ffffff"/>
-                      </a:solidFill>
-                    </a:lnL>
-                    <a:lnR w="12240">
-                      <a:solidFill>
-                        <a:srgbClr val="ffffff"/>
-                      </a:solidFill>
-                    </a:lnR>
-                    <a:lnT w="12240">
-                      <a:solidFill>
-                        <a:srgbClr val="ffffff"/>
-                      </a:solidFill>
-                    </a:lnT>
-                    <a:lnB w="12240">
-                      <a:solidFill>
-                        <a:srgbClr val="ffffff"/>
-                      </a:solidFill>
-                    </a:lnB>
-                    <a:solidFill>
-                      <a:srgbClr val="d0d8e7"/>
-                    </a:solidFill>
-                  </a:tcPr>
-                </a:tc>
-              </a:tr>
-              <a:tr h="383040">
-                <a:tc>
-                  <a:txBody>
-                    <a:bodyPr/>
-                    <a:p>
-                      <a:pPr>
-                        <a:lnSpc>
-                          <a:spcPct val="100000"/>
-                        </a:lnSpc>
-                      </a:pPr>
-                      <a:r>
-                        <a:rPr b="0" lang="pt-BR" sz="1200" spc="-1" strike="noStrike">
-                          <a:solidFill>
-                            <a:srgbClr val="000000"/>
-                          </a:solidFill>
-                          <a:uFill>
-                            <a:solidFill>
-                              <a:srgbClr val="ffffff"/>
-                            </a:solidFill>
-                          </a:uFill>
-                          <a:latin typeface="Arial"/>
-                          <a:ea typeface="DejaVu Sans"/>
+                          <a:latin typeface="Times New Roman"/>
                         </a:rPr>
                         <a:t>4</a:t>
                       </a:r>
@@ -12350,76 +11854,8 @@
                   <a:txBody>
                     <a:bodyPr/>
                     <a:p>
-                      <a:pPr>
-                        <a:lnSpc>
-                          <a:spcPct val="100000"/>
-                        </a:lnSpc>
-                      </a:pPr>
                       <a:r>
-                        <a:rPr b="0" lang="pt-BR" sz="1000" spc="-1" strike="noStrike">
-                          <a:solidFill>
-                            <a:srgbClr val="000000"/>
-                          </a:solidFill>
-                          <a:uFill>
-                            <a:solidFill>
-                              <a:srgbClr val="ffffff"/>
-                            </a:solidFill>
-                          </a:uFill>
-                          <a:latin typeface="Arial"/>
-                          <a:ea typeface="DejaVu Sans"/>
-                        </a:rPr>
-                        <a:t>Gerenciar registro de cadastro nas portas biométricas</a:t>
-                      </a:r>
-                      <a:endParaRPr b="0" lang="pt-BR" sz="1800" spc="-1" strike="noStrike">
-                        <a:solidFill>
-                          <a:srgbClr val="000000"/>
-                        </a:solidFill>
-                        <a:uFill>
-                          <a:solidFill>
-                            <a:srgbClr val="ffffff"/>
-                          </a:solidFill>
-                        </a:uFill>
-                        <a:latin typeface="Arial"/>
-                      </a:endParaRPr>
-                    </a:p>
-                  </a:txBody>
-                  <a:tcPr marL="91440" marR="91440">
-                    <a:lnL w="12240">
-                      <a:solidFill>
-                        <a:srgbClr val="ffffff"/>
-                      </a:solidFill>
-                    </a:lnL>
-                    <a:lnR w="12240">
-                      <a:solidFill>
-                        <a:srgbClr val="ffffff"/>
-                      </a:solidFill>
-                    </a:lnR>
-                    <a:lnT w="12240">
-                      <a:solidFill>
-                        <a:srgbClr val="ffffff"/>
-                      </a:solidFill>
-                    </a:lnT>
-                    <a:lnB w="12240">
-                      <a:solidFill>
-                        <a:srgbClr val="ffffff"/>
-                      </a:solidFill>
-                    </a:lnB>
-                    <a:solidFill>
-                      <a:srgbClr val="e9ecf3"/>
-                    </a:solidFill>
-                  </a:tcPr>
-                </a:tc>
-                <a:tc>
-                  <a:txBody>
-                    <a:bodyPr/>
-                    <a:p>
-                      <a:pPr algn="ctr">
-                        <a:lnSpc>
-                          <a:spcPct val="100000"/>
-                        </a:lnSpc>
-                      </a:pPr>
-                      <a:r>
-                        <a:rPr b="0" lang="pt-BR" sz="2000" spc="-1" strike="noStrike">
+                        <a:rPr b="0" lang="pt-BR" sz="2400" spc="-1" strike="noStrike">
                           <a:solidFill>
                             <a:srgbClr val="000000"/>
                           </a:solidFill>
@@ -12430,9 +11866,9 @@
                           </a:uFill>
                           <a:latin typeface="Times New Roman"/>
                         </a:rPr>
-                        <a:t>2</a:t>
+                        <a:t>3</a:t>
                       </a:r>
-                      <a:endParaRPr b="0" lang="pt-BR" sz="1800" spc="-1" strike="noStrike">
+                      <a:endParaRPr b="0" lang="pt-BR" sz="2400" spc="-1" strike="noStrike">
                         <a:solidFill>
                           <a:srgbClr val="000000"/>
                         </a:solidFill>
@@ -12441,7 +11877,7 @@
                             <a:srgbClr val="ffffff"/>
                           </a:solidFill>
                         </a:uFill>
-                        <a:latin typeface="Arial"/>
+                        <a:latin typeface="Times New Roman"/>
                       </a:endParaRPr>
                     </a:p>
                   </a:txBody>
@@ -12472,362 +11908,11 @@
                   </a:tcPr>
                 </a:tc>
                 <a:tc rowSpan="2">
-                  <a:tcPr marL="91440" marR="91440">
-                    <a:lnL w="12240">
-                      <a:solidFill>
-                        <a:srgbClr val="ffffff"/>
-                      </a:solidFill>
-                    </a:lnL>
-                    <a:lnR w="12240">
-                      <a:solidFill>
-                        <a:srgbClr val="ffffff"/>
-                      </a:solidFill>
-                    </a:lnR>
-                    <a:lnT w="12240">
-                      <a:solidFill>
-                        <a:srgbClr val="ffffff"/>
-                      </a:solidFill>
-                    </a:lnT>
-                    <a:lnB w="12240">
-                      <a:solidFill>
-                        <a:srgbClr val="ffffff"/>
-                      </a:solidFill>
-                    </a:lnB>
-                    <a:solidFill>
-                      <a:srgbClr val="e9ecf3"/>
-                    </a:solidFill>
-                  </a:tcPr>
-                </a:tc>
-              </a:tr>
-              <a:tr h="383040">
-                <a:tc>
                   <a:txBody>
                     <a:bodyPr/>
                     <a:p>
-                      <a:pPr>
-                        <a:lnSpc>
-                          <a:spcPct val="100000"/>
-                        </a:lnSpc>
-                      </a:pPr>
                       <a:r>
-                        <a:rPr b="0" lang="pt-BR" sz="1200" spc="-1" strike="noStrike">
-                          <a:solidFill>
-                            <a:srgbClr val="000000"/>
-                          </a:solidFill>
-                          <a:uFill>
-                            <a:solidFill>
-                              <a:srgbClr val="ffffff"/>
-                            </a:solidFill>
-                          </a:uFill>
-                          <a:latin typeface="Arial"/>
-                          <a:ea typeface="DejaVu Sans"/>
-                        </a:rPr>
-                        <a:t>5</a:t>
-                      </a:r>
-                      <a:endParaRPr b="0" lang="pt-BR" sz="1800" spc="-1" strike="noStrike">
-                        <a:solidFill>
-                          <a:srgbClr val="000000"/>
-                        </a:solidFill>
-                        <a:uFill>
-                          <a:solidFill>
-                            <a:srgbClr val="ffffff"/>
-                          </a:solidFill>
-                        </a:uFill>
-                        <a:latin typeface="Arial"/>
-                      </a:endParaRPr>
-                    </a:p>
-                  </a:txBody>
-                  <a:tcPr marL="91440" marR="91440">
-                    <a:lnL w="12240">
-                      <a:solidFill>
-                        <a:srgbClr val="ffffff"/>
-                      </a:solidFill>
-                    </a:lnL>
-                    <a:lnR w="12240">
-                      <a:solidFill>
-                        <a:srgbClr val="ffffff"/>
-                      </a:solidFill>
-                    </a:lnR>
-                    <a:lnT w="12240">
-                      <a:solidFill>
-                        <a:srgbClr val="ffffff"/>
-                      </a:solidFill>
-                    </a:lnT>
-                    <a:lnB w="12240">
-                      <a:solidFill>
-                        <a:srgbClr val="ffffff"/>
-                      </a:solidFill>
-                    </a:lnB>
-                    <a:solidFill>
-                      <a:srgbClr val="d0d8e7"/>
-                    </a:solidFill>
-                  </a:tcPr>
-                </a:tc>
-                <a:tc>
-                  <a:txBody>
-                    <a:bodyPr/>
-                    <a:p>
-                      <a:pPr>
-                        <a:lnSpc>
-                          <a:spcPct val="100000"/>
-                        </a:lnSpc>
-                      </a:pPr>
-                      <a:r>
-                        <a:rPr b="0" lang="pt-BR" sz="1000" spc="-1" strike="noStrike">
-                          <a:solidFill>
-                            <a:srgbClr val="000000"/>
-                          </a:solidFill>
-                          <a:uFill>
-                            <a:solidFill>
-                              <a:srgbClr val="ffffff"/>
-                            </a:solidFill>
-                          </a:uFill>
-                          <a:latin typeface="Arial"/>
-                          <a:ea typeface="DejaVu Sans"/>
-                        </a:rPr>
-                        <a:t>Gerenciar fornecedores</a:t>
-                      </a:r>
-                      <a:endParaRPr b="0" lang="pt-BR" sz="1800" spc="-1" strike="noStrike">
-                        <a:solidFill>
-                          <a:srgbClr val="000000"/>
-                        </a:solidFill>
-                        <a:uFill>
-                          <a:solidFill>
-                            <a:srgbClr val="ffffff"/>
-                          </a:solidFill>
-                        </a:uFill>
-                        <a:latin typeface="Arial"/>
-                      </a:endParaRPr>
-                    </a:p>
-                  </a:txBody>
-                  <a:tcPr marL="91440" marR="91440">
-                    <a:lnL w="12240">
-                      <a:solidFill>
-                        <a:srgbClr val="ffffff"/>
-                      </a:solidFill>
-                    </a:lnL>
-                    <a:lnR w="12240">
-                      <a:solidFill>
-                        <a:srgbClr val="ffffff"/>
-                      </a:solidFill>
-                    </a:lnR>
-                    <a:lnT w="12240">
-                      <a:solidFill>
-                        <a:srgbClr val="ffffff"/>
-                      </a:solidFill>
-                    </a:lnT>
-                    <a:lnB w="12240">
-                      <a:solidFill>
-                        <a:srgbClr val="ffffff"/>
-                      </a:solidFill>
-                    </a:lnB>
-                    <a:solidFill>
-                      <a:srgbClr val="d0d8e7"/>
-                    </a:solidFill>
-                  </a:tcPr>
-                </a:tc>
-                <a:tc>
-                  <a:txBody>
-                    <a:bodyPr/>
-                    <a:p>
-                      <a:pPr algn="ctr">
-                        <a:lnSpc>
-                          <a:spcPct val="100000"/>
-                        </a:lnSpc>
-                      </a:pPr>
-                      <a:r>
-                        <a:rPr b="0" lang="pt-BR" sz="2000" spc="-1" strike="noStrike">
-                          <a:solidFill>
-                            <a:srgbClr val="000000"/>
-                          </a:solidFill>
-                          <a:uFill>
-                            <a:solidFill>
-                              <a:srgbClr val="ffffff"/>
-                            </a:solidFill>
-                          </a:uFill>
-                          <a:latin typeface="Arial"/>
-                          <a:ea typeface="DejaVu Sans"/>
-                        </a:rPr>
-                        <a:t>1</a:t>
-                      </a:r>
-                      <a:endParaRPr b="0" lang="pt-BR" sz="1800" spc="-1" strike="noStrike">
-                        <a:solidFill>
-                          <a:srgbClr val="000000"/>
-                        </a:solidFill>
-                        <a:uFill>
-                          <a:solidFill>
-                            <a:srgbClr val="ffffff"/>
-                          </a:solidFill>
-                        </a:uFill>
-                        <a:latin typeface="Arial"/>
-                      </a:endParaRPr>
-                    </a:p>
-                  </a:txBody>
-                  <a:tcPr marL="91440" marR="91440">
-                    <a:lnL w="12240">
-                      <a:solidFill>
-                        <a:srgbClr val="ffffff"/>
-                      </a:solidFill>
-                    </a:lnL>
-                    <a:lnR w="12240">
-                      <a:solidFill>
-                        <a:srgbClr val="ffffff"/>
-                      </a:solidFill>
-                    </a:lnR>
-                    <a:lnT w="12240">
-                      <a:solidFill>
-                        <a:srgbClr val="ffffff"/>
-                      </a:solidFill>
-                    </a:lnT>
-                    <a:lnB w="12240">
-                      <a:solidFill>
-                        <a:srgbClr val="ffffff"/>
-                      </a:solidFill>
-                    </a:lnB>
-                    <a:solidFill>
-                      <a:srgbClr val="d0d8e7"/>
-                    </a:solidFill>
-                  </a:tcPr>
-                </a:tc>
-              </a:tr>
-              <a:tr h="383040">
-                <a:tc>
-                  <a:txBody>
-                    <a:bodyPr/>
-                    <a:p>
-                      <a:pPr>
-                        <a:lnSpc>
-                          <a:spcPct val="100000"/>
-                        </a:lnSpc>
-                      </a:pPr>
-                      <a:r>
-                        <a:rPr b="0" lang="pt-BR" sz="1200" spc="-1" strike="noStrike">
-                          <a:solidFill>
-                            <a:srgbClr val="000000"/>
-                          </a:solidFill>
-                          <a:uFill>
-                            <a:solidFill>
-                              <a:srgbClr val="ffffff"/>
-                            </a:solidFill>
-                          </a:uFill>
-                          <a:latin typeface="Arial"/>
-                          <a:ea typeface="DejaVu Sans"/>
-                        </a:rPr>
-                        <a:t>7</a:t>
-                      </a:r>
-                      <a:endParaRPr b="0" lang="pt-BR" sz="1800" spc="-1" strike="noStrike">
-                        <a:solidFill>
-                          <a:srgbClr val="000000"/>
-                        </a:solidFill>
-                        <a:uFill>
-                          <a:solidFill>
-                            <a:srgbClr val="ffffff"/>
-                          </a:solidFill>
-                        </a:uFill>
-                        <a:latin typeface="Arial"/>
-                      </a:endParaRPr>
-                    </a:p>
-                  </a:txBody>
-                  <a:tcPr marL="91440" marR="91440">
-                    <a:lnL w="12240">
-                      <a:solidFill>
-                        <a:srgbClr val="ffffff"/>
-                      </a:solidFill>
-                    </a:lnL>
-                    <a:lnR w="12240">
-                      <a:solidFill>
-                        <a:srgbClr val="ffffff"/>
-                      </a:solidFill>
-                    </a:lnR>
-                    <a:lnT w="12240">
-                      <a:solidFill>
-                        <a:srgbClr val="ffffff"/>
-                      </a:solidFill>
-                    </a:lnT>
-                    <a:lnB w="12240">
-                      <a:solidFill>
-                        <a:srgbClr val="ffffff"/>
-                      </a:solidFill>
-                    </a:lnB>
-                    <a:solidFill>
-                      <a:srgbClr val="d0d8e7"/>
-                    </a:solidFill>
-                  </a:tcPr>
-                </a:tc>
-                <a:tc>
-                  <a:txBody>
-                    <a:bodyPr/>
-                    <a:p>
-                      <a:pPr>
-                        <a:lnSpc>
-                          <a:spcPct val="100000"/>
-                        </a:lnSpc>
-                      </a:pPr>
-                      <a:r>
-                        <a:rPr b="0" lang="pt-BR" sz="1000" spc="-1" strike="noStrike">
-                          <a:solidFill>
-                            <a:srgbClr val="000000"/>
-                          </a:solidFill>
-                          <a:uFill>
-                            <a:solidFill>
-                              <a:srgbClr val="ffffff"/>
-                            </a:solidFill>
-                          </a:uFill>
-                          <a:latin typeface="Arial"/>
-                          <a:ea typeface="DejaVu Sans"/>
-                        </a:rPr>
-                        <a:t>Gerenciamento de Materiais para Serviços de TI</a:t>
-                      </a:r>
-                      <a:endParaRPr b="0" lang="pt-BR" sz="1800" spc="-1" strike="noStrike">
-                        <a:solidFill>
-                          <a:srgbClr val="000000"/>
-                        </a:solidFill>
-                        <a:uFill>
-                          <a:solidFill>
-                            <a:srgbClr val="ffffff"/>
-                          </a:solidFill>
-                        </a:uFill>
-                        <a:latin typeface="Arial"/>
-                      </a:endParaRPr>
-                    </a:p>
-                  </a:txBody>
-                  <a:tcPr marL="91440" marR="91440">
-                    <a:lnL w="12240">
-                      <a:solidFill>
-                        <a:srgbClr val="ffffff"/>
-                      </a:solidFill>
-                    </a:lnL>
-                    <a:lnR w="12240">
-                      <a:solidFill>
-                        <a:srgbClr val="ffffff"/>
-                      </a:solidFill>
-                    </a:lnR>
-                    <a:lnT w="12240">
-                      <a:solidFill>
-                        <a:srgbClr val="ffffff"/>
-                      </a:solidFill>
-                    </a:lnT>
-                    <a:lnB w="12240">
-                      <a:solidFill>
-                        <a:srgbClr val="ffffff"/>
-                      </a:solidFill>
-                    </a:lnB>
-                    <a:solidFill>
-                      <a:srgbClr val="d0d8e7"/>
-                    </a:solidFill>
-                  </a:tcPr>
-                </a:tc>
-                <a:tc>
-                  <a:txBody>
-                    <a:bodyPr/>
-                    <a:p>
-                      <a:pPr algn="ctr">
-                        <a:lnSpc>
-                          <a:spcPct val="100000"/>
-                        </a:lnSpc>
-                      </a:pPr>
-                      <a:r>
-                        <a:rPr b="0" lang="pt-BR" sz="2000" spc="-1" strike="noStrike">
+                        <a:rPr b="0" lang="pt-BR" sz="2400" spc="-1" strike="noStrike">
                           <a:solidFill>
                             <a:srgbClr val="000000"/>
                           </a:solidFill>
@@ -12838,9 +11923,9 @@
                           </a:uFill>
                           <a:latin typeface="Times New Roman"/>
                         </a:rPr>
-                        <a:t>2</a:t>
+                        <a:t>4</a:t>
                       </a:r>
-                      <a:endParaRPr b="0" lang="pt-BR" sz="1800" spc="-1" strike="noStrike">
+                      <a:endParaRPr b="0" lang="pt-BR" sz="2400" spc="-1" strike="noStrike">
                         <a:solidFill>
                           <a:srgbClr val="000000"/>
                         </a:solidFill>
@@ -12849,37 +11934,10 @@
                             <a:srgbClr val="ffffff"/>
                           </a:solidFill>
                         </a:uFill>
-                        <a:latin typeface="Arial"/>
+                        <a:latin typeface="Times New Roman"/>
                       </a:endParaRPr>
                     </a:p>
                   </a:txBody>
-                  <a:tcPr marL="91440" marR="91440">
-                    <a:lnL w="12240">
-                      <a:solidFill>
-                        <a:srgbClr val="ffffff"/>
-                      </a:solidFill>
-                    </a:lnL>
-                    <a:lnR w="12240">
-                      <a:solidFill>
-                        <a:srgbClr val="ffffff"/>
-                      </a:solidFill>
-                    </a:lnR>
-                    <a:lnT w="12240">
-                      <a:solidFill>
-                        <a:srgbClr val="ffffff"/>
-                      </a:solidFill>
-                    </a:lnT>
-                    <a:lnB w="12240">
-                      <a:solidFill>
-                        <a:srgbClr val="ffffff"/>
-                      </a:solidFill>
-                    </a:lnB>
-                    <a:solidFill>
-                      <a:srgbClr val="d0d8e7"/>
-                    </a:solidFill>
-                  </a:tcPr>
-                </a:tc>
-                <a:tc>
                   <a:tcPr marL="91440" marR="91440">
                     <a:lnL w="12240">
                       <a:solidFill>
@@ -12930,7 +11988,255 @@
                           <a:latin typeface="Arial"/>
                           <a:ea typeface="Calibri"/>
                         </a:rPr>
-                        <a:t>8</a:t>
+                        <a:t>9</a:t>
+                      </a:r>
+                      <a:endParaRPr b="0" lang="pt-BR" sz="1800" spc="-1" strike="noStrike">
+                        <a:solidFill>
+                          <a:srgbClr val="000000"/>
+                        </a:solidFill>
+                        <a:uFill>
+                          <a:solidFill>
+                            <a:srgbClr val="ffffff"/>
+                          </a:solidFill>
+                        </a:uFill>
+                        <a:latin typeface="Arial"/>
+                      </a:endParaRPr>
+                    </a:p>
+                  </a:txBody>
+                  <a:tcPr marL="68400" marR="68400">
+                    <a:lnL w="12240">
+                      <a:solidFill>
+                        <a:srgbClr val="ffffff"/>
+                      </a:solidFill>
+                    </a:lnL>
+                    <a:lnR w="12240">
+                      <a:solidFill>
+                        <a:srgbClr val="ffffff"/>
+                      </a:solidFill>
+                    </a:lnR>
+                    <a:lnT w="12240">
+                      <a:solidFill>
+                        <a:srgbClr val="ffffff"/>
+                      </a:solidFill>
+                    </a:lnT>
+                    <a:lnB w="12240">
+                      <a:solidFill>
+                        <a:srgbClr val="ffffff"/>
+                      </a:solidFill>
+                    </a:lnB>
+                    <a:solidFill>
+                      <a:srgbClr val="d0d8e7"/>
+                    </a:solidFill>
+                  </a:tcPr>
+                </a:tc>
+                <a:tc>
+                  <a:txBody>
+                    <a:bodyPr lIns="68400" rIns="68400"/>
+                    <a:p>
+                      <a:pPr>
+                        <a:lnSpc>
+                          <a:spcPct val="115000"/>
+                        </a:lnSpc>
+                      </a:pPr>
+                      <a:r>
+                        <a:rPr b="0" lang="pt-BR" sz="1000" spc="-1" strike="noStrike">
+                          <a:solidFill>
+                            <a:srgbClr val="000000"/>
+                          </a:solidFill>
+                          <a:uFill>
+                            <a:solidFill>
+                              <a:srgbClr val="ffffff"/>
+                            </a:solidFill>
+                          </a:uFill>
+                          <a:latin typeface="Arial"/>
+                          <a:ea typeface="Arial Narrow"/>
+                        </a:rPr>
+                        <a:t>Gerir o empréstimos de equipamentos  e materiais</a:t>
+                      </a:r>
+                      <a:endParaRPr b="0" lang="pt-BR" sz="1800" spc="-1" strike="noStrike">
+                        <a:solidFill>
+                          <a:srgbClr val="000000"/>
+                        </a:solidFill>
+                        <a:uFill>
+                          <a:solidFill>
+                            <a:srgbClr val="ffffff"/>
+                          </a:solidFill>
+                        </a:uFill>
+                        <a:latin typeface="Arial"/>
+                      </a:endParaRPr>
+                    </a:p>
+                  </a:txBody>
+                  <a:tcPr marL="68400" marR="68400">
+                    <a:lnL w="12240">
+                      <a:solidFill>
+                        <a:srgbClr val="ffffff"/>
+                      </a:solidFill>
+                    </a:lnL>
+                    <a:lnR w="12240">
+                      <a:solidFill>
+                        <a:srgbClr val="ffffff"/>
+                      </a:solidFill>
+                    </a:lnR>
+                    <a:lnT w="12240">
+                      <a:solidFill>
+                        <a:srgbClr val="ffffff"/>
+                      </a:solidFill>
+                    </a:lnT>
+                    <a:lnB w="12240">
+                      <a:solidFill>
+                        <a:srgbClr val="ffffff"/>
+                      </a:solidFill>
+                    </a:lnB>
+                    <a:solidFill>
+                      <a:srgbClr val="d0d8e7"/>
+                    </a:solidFill>
+                  </a:tcPr>
+                </a:tc>
+                <a:tc>
+                  <a:txBody>
+                    <a:bodyPr/>
+                    <a:p>
+                      <a:pPr algn="ctr">
+                        <a:lnSpc>
+                          <a:spcPct val="100000"/>
+                        </a:lnSpc>
+                      </a:pPr>
+                      <a:r>
+                        <a:rPr b="0" lang="pt-BR" sz="2000" spc="-1" strike="noStrike">
+                          <a:solidFill>
+                            <a:srgbClr val="000000"/>
+                          </a:solidFill>
+                          <a:uFill>
+                            <a:solidFill>
+                              <a:srgbClr val="ffffff"/>
+                            </a:solidFill>
+                          </a:uFill>
+                          <a:latin typeface="Arial"/>
+                          <a:ea typeface="DejaVu Sans"/>
+                        </a:rPr>
+                        <a:t>4</a:t>
+                      </a:r>
+                      <a:endParaRPr b="0" lang="pt-BR" sz="1800" spc="-1" strike="noStrike">
+                        <a:solidFill>
+                          <a:srgbClr val="000000"/>
+                        </a:solidFill>
+                        <a:uFill>
+                          <a:solidFill>
+                            <a:srgbClr val="ffffff"/>
+                          </a:solidFill>
+                        </a:uFill>
+                        <a:latin typeface="Arial"/>
+                      </a:endParaRPr>
+                    </a:p>
+                  </a:txBody>
+                  <a:tcPr marL="91440" marR="91440">
+                    <a:lnL w="12240">
+                      <a:solidFill>
+                        <a:srgbClr val="ffffff"/>
+                      </a:solidFill>
+                    </a:lnL>
+                    <a:lnR w="12240">
+                      <a:solidFill>
+                        <a:srgbClr val="ffffff"/>
+                      </a:solidFill>
+                    </a:lnR>
+                    <a:lnT w="12240">
+                      <a:solidFill>
+                        <a:srgbClr val="ffffff"/>
+                      </a:solidFill>
+                    </a:lnT>
+                    <a:lnB w="12240">
+                      <a:solidFill>
+                        <a:srgbClr val="ffffff"/>
+                      </a:solidFill>
+                    </a:lnB>
+                    <a:solidFill>
+                      <a:srgbClr val="d0d8e7"/>
+                    </a:solidFill>
+                  </a:tcPr>
+                </a:tc>
+                <a:tc>
+                  <a:txBody>
+                    <a:bodyPr/>
+                    <a:p>
+                      <a:r>
+                        <a:rPr b="0" lang="pt-BR" sz="2400" spc="-1" strike="noStrike">
+                          <a:solidFill>
+                            <a:srgbClr val="000000"/>
+                          </a:solidFill>
+                          <a:uFill>
+                            <a:solidFill>
+                              <a:srgbClr val="ffffff"/>
+                            </a:solidFill>
+                          </a:uFill>
+                          <a:latin typeface="Times New Roman"/>
+                        </a:rPr>
+                        <a:t>3</a:t>
+                      </a:r>
+                      <a:endParaRPr b="0" lang="pt-BR" sz="2400" spc="-1" strike="noStrike">
+                        <a:solidFill>
+                          <a:srgbClr val="000000"/>
+                        </a:solidFill>
+                        <a:uFill>
+                          <a:solidFill>
+                            <a:srgbClr val="ffffff"/>
+                          </a:solidFill>
+                        </a:uFill>
+                        <a:latin typeface="Times New Roman"/>
+                      </a:endParaRPr>
+                    </a:p>
+                  </a:txBody>
+                  <a:tcPr marL="91440" marR="91440">
+                    <a:lnL w="12240">
+                      <a:solidFill>
+                        <a:srgbClr val="ffffff"/>
+                      </a:solidFill>
+                    </a:lnL>
+                    <a:lnR w="12240">
+                      <a:solidFill>
+                        <a:srgbClr val="ffffff"/>
+                      </a:solidFill>
+                    </a:lnR>
+                    <a:lnT w="12240">
+                      <a:solidFill>
+                        <a:srgbClr val="ffffff"/>
+                      </a:solidFill>
+                    </a:lnT>
+                    <a:lnB w="12240">
+                      <a:solidFill>
+                        <a:srgbClr val="ffffff"/>
+                      </a:solidFill>
+                    </a:lnB>
+                    <a:solidFill>
+                      <a:srgbClr val="d0d8e7"/>
+                    </a:solidFill>
+                  </a:tcPr>
+                </a:tc>
+              </a:tr>
+              <a:tr h="383040">
+                <a:tc>
+                  <a:txBody>
+                    <a:bodyPr lIns="68400" rIns="68400"/>
+                    <a:p>
+                      <a:pPr>
+                        <a:lnSpc>
+                          <a:spcPct val="115000"/>
+                        </a:lnSpc>
+                      </a:pPr>
+                      <a:r>
+                        <a:rPr b="0" lang="pt-BR" sz="1200" spc="-1" strike="noStrike">
+                          <a:solidFill>
+                            <a:srgbClr val="000000"/>
+                          </a:solidFill>
+                          <a:uFill>
+                            <a:solidFill>
+                              <a:srgbClr val="ffffff"/>
+                            </a:solidFill>
+                          </a:uFill>
+                          <a:latin typeface="Arial"/>
+                          <a:ea typeface="Calibri"/>
+                        </a:rPr>
+                        <a:t>10</a:t>
                       </a:r>
                       <a:endParaRPr b="0" lang="pt-BR" sz="1800" spc="-1" strike="noStrike">
                         <a:solidFill>
@@ -12993,7 +12299,7 @@
                           <a:latin typeface="Arial"/>
                           <a:ea typeface="Arial Narrow"/>
                         </a:rPr>
-                        <a:t>Gerir a Transferência de equipamentos e materiais</a:t>
+                        <a:t>Gerenciamento de serviços de manutenção ou conserto prestados por terceiros</a:t>
                       </a:r>
                       <a:endParaRPr b="0" lang="pt-BR" sz="1800" spc="-1" strike="noStrike">
                         <a:solidFill>
@@ -13053,9 +12359,10 @@
                               <a:srgbClr val="ffffff"/>
                             </a:solidFill>
                           </a:uFill>
-                          <a:latin typeface="Times New Roman"/>
+                          <a:latin typeface="Arial"/>
+                          <a:ea typeface="DejaVu Sans"/>
                         </a:rPr>
-                        <a:t>4</a:t>
+                        <a:t>3</a:t>
                       </a:r>
                       <a:endParaRPr b="0" lang="pt-BR" sz="1800" spc="-1" strike="noStrike">
                         <a:solidFill>
@@ -13096,7 +12403,94 @@
                     </a:solidFill>
                   </a:tcPr>
                 </a:tc>
+                <a:tc>
+                  <a:txBody>
+                    <a:bodyPr/>
+                    <a:p>
+                      <a:r>
+                        <a:rPr b="0" lang="pt-BR" sz="2400" spc="-1" strike="noStrike">
+                          <a:solidFill>
+                            <a:srgbClr val="000000"/>
+                          </a:solidFill>
+                          <a:uFill>
+                            <a:solidFill>
+                              <a:srgbClr val="ffffff"/>
+                            </a:solidFill>
+                          </a:uFill>
+                          <a:latin typeface="Times New Roman"/>
+                        </a:rPr>
+                        <a:t>5</a:t>
+                      </a:r>
+                      <a:endParaRPr b="0" lang="pt-BR" sz="2400" spc="-1" strike="noStrike">
+                        <a:solidFill>
+                          <a:srgbClr val="000000"/>
+                        </a:solidFill>
+                        <a:uFill>
+                          <a:solidFill>
+                            <a:srgbClr val="ffffff"/>
+                          </a:solidFill>
+                        </a:uFill>
+                        <a:latin typeface="Times New Roman"/>
+                      </a:endParaRPr>
+                    </a:p>
+                  </a:txBody>
+                  <a:tcPr marL="91440" marR="91440">
+                    <a:lnL w="12240">
+                      <a:solidFill>
+                        <a:srgbClr val="ffffff"/>
+                      </a:solidFill>
+                    </a:lnL>
+                    <a:lnR w="12240">
+                      <a:solidFill>
+                        <a:srgbClr val="ffffff"/>
+                      </a:solidFill>
+                    </a:lnR>
+                    <a:lnT w="12240">
+                      <a:solidFill>
+                        <a:srgbClr val="ffffff"/>
+                      </a:solidFill>
+                    </a:lnT>
+                    <a:lnB w="12240">
+                      <a:solidFill>
+                        <a:srgbClr val="ffffff"/>
+                      </a:solidFill>
+                    </a:lnB>
+                    <a:solidFill>
+                      <a:srgbClr val="e9ecf3"/>
+                    </a:solidFill>
+                  </a:tcPr>
+                </a:tc>
                 <a:tc rowSpan="2">
+                  <a:txBody>
+                    <a:bodyPr/>
+                    <a:p>
+                      <a:r>
+                        <a:rPr b="0" lang="pt-BR" sz="2400" spc="-1" strike="noStrike">
+                          <a:solidFill>
+                            <a:srgbClr val="000000"/>
+                          </a:solidFill>
+                          <a:uFill>
+                            <a:solidFill>
+                              <a:srgbClr val="ffffff"/>
+                            </a:solidFill>
+                          </a:uFill>
+                          <a:latin typeface="Times New Roman"/>
+                        </a:rPr>
+                        <a:t>3</a:t>
+                      </a:r>
+                      <a:endParaRPr b="0" lang="pt-BR" sz="2400" spc="-1" strike="noStrike">
+                        <a:solidFill>
+                          <a:srgbClr val="000000"/>
+                        </a:solidFill>
+                        <a:uFill>
+                          <a:solidFill>
+                            <a:srgbClr val="ffffff"/>
+                          </a:solidFill>
+                        </a:uFill>
+                        <a:latin typeface="Times New Roman"/>
+                      </a:endParaRPr>
+                    </a:p>
+                  </a:txBody>
                   <a:tcPr marL="91440" marR="91440">
                     <a:lnL w="12240">
                       <a:solidFill>
@@ -13147,7 +12541,7 @@
                           <a:latin typeface="Arial"/>
                           <a:ea typeface="Calibri"/>
                         </a:rPr>
-                        <a:t>9</a:t>
+                        <a:t>11</a:t>
                       </a:r>
                       <a:endParaRPr b="0" lang="pt-BR" sz="1800" spc="-1" strike="noStrike">
                         <a:solidFill>
@@ -13210,7 +12604,7 @@
                           <a:latin typeface="Arial"/>
                           <a:ea typeface="Arial Narrow"/>
                         </a:rPr>
-                        <a:t>Gerir o empréstimos de equipamentos  e materiais</a:t>
+                        <a:t>Gerenciamento de serviços de manutenção ou conserto realizados internamente</a:t>
                       </a:r>
                       <a:endParaRPr b="0" lang="pt-BR" sz="1800" spc="-1" strike="noStrike">
                         <a:solidFill>
@@ -13273,197 +12667,6 @@
                           <a:latin typeface="Arial"/>
                           <a:ea typeface="DejaVu Sans"/>
                         </a:rPr>
-                        <a:t>4</a:t>
-                      </a:r>
-                      <a:endParaRPr b="0" lang="pt-BR" sz="1800" spc="-1" strike="noStrike">
-                        <a:solidFill>
-                          <a:srgbClr val="000000"/>
-                        </a:solidFill>
-                        <a:uFill>
-                          <a:solidFill>
-                            <a:srgbClr val="ffffff"/>
-                          </a:solidFill>
-                        </a:uFill>
-                        <a:latin typeface="Arial"/>
-                      </a:endParaRPr>
-                    </a:p>
-                  </a:txBody>
-                  <a:tcPr marL="91440" marR="91440">
-                    <a:lnL w="12240">
-                      <a:solidFill>
-                        <a:srgbClr val="ffffff"/>
-                      </a:solidFill>
-                    </a:lnL>
-                    <a:lnR w="12240">
-                      <a:solidFill>
-                        <a:srgbClr val="ffffff"/>
-                      </a:solidFill>
-                    </a:lnR>
-                    <a:lnT w="12240">
-                      <a:solidFill>
-                        <a:srgbClr val="ffffff"/>
-                      </a:solidFill>
-                    </a:lnT>
-                    <a:lnB w="12240">
-                      <a:solidFill>
-                        <a:srgbClr val="ffffff"/>
-                      </a:solidFill>
-                    </a:lnB>
-                    <a:solidFill>
-                      <a:srgbClr val="d0d8e7"/>
-                    </a:solidFill>
-                  </a:tcPr>
-                </a:tc>
-              </a:tr>
-              <a:tr h="383040">
-                <a:tc>
-                  <a:txBody>
-                    <a:bodyPr lIns="68400" rIns="68400"/>
-                    <a:p>
-                      <a:pPr>
-                        <a:lnSpc>
-                          <a:spcPct val="115000"/>
-                        </a:lnSpc>
-                      </a:pPr>
-                      <a:r>
-                        <a:rPr b="0" lang="pt-BR" sz="1200" spc="-1" strike="noStrike">
-                          <a:solidFill>
-                            <a:srgbClr val="000000"/>
-                          </a:solidFill>
-                          <a:uFill>
-                            <a:solidFill>
-                              <a:srgbClr val="ffffff"/>
-                            </a:solidFill>
-                          </a:uFill>
-                          <a:latin typeface="Arial"/>
-                          <a:ea typeface="Calibri"/>
-                        </a:rPr>
-                        <a:t>10</a:t>
-                      </a:r>
-                      <a:endParaRPr b="0" lang="pt-BR" sz="1800" spc="-1" strike="noStrike">
-                        <a:solidFill>
-                          <a:srgbClr val="000000"/>
-                        </a:solidFill>
-                        <a:uFill>
-                          <a:solidFill>
-                            <a:srgbClr val="ffffff"/>
-                          </a:solidFill>
-                        </a:uFill>
-                        <a:latin typeface="Arial"/>
-                      </a:endParaRPr>
-                    </a:p>
-                  </a:txBody>
-                  <a:tcPr marL="68400" marR="68400">
-                    <a:lnL w="12240">
-                      <a:solidFill>
-                        <a:srgbClr val="ffffff"/>
-                      </a:solidFill>
-                    </a:lnL>
-                    <a:lnR w="12240">
-                      <a:solidFill>
-                        <a:srgbClr val="ffffff"/>
-                      </a:solidFill>
-                    </a:lnR>
-                    <a:lnT w="12240">
-                      <a:solidFill>
-                        <a:srgbClr val="ffffff"/>
-                      </a:solidFill>
-                    </a:lnT>
-                    <a:lnB w="12240">
-                      <a:solidFill>
-                        <a:srgbClr val="ffffff"/>
-                      </a:solidFill>
-                    </a:lnB>
-                    <a:solidFill>
-                      <a:srgbClr val="e9ecf3"/>
-                    </a:solidFill>
-                  </a:tcPr>
-                </a:tc>
-                <a:tc>
-                  <a:txBody>
-                    <a:bodyPr lIns="68400" rIns="68400"/>
-                    <a:p>
-                      <a:pPr>
-                        <a:lnSpc>
-                          <a:spcPct val="115000"/>
-                        </a:lnSpc>
-                      </a:pPr>
-                      <a:r>
-                        <a:rPr b="0" lang="pt-BR" sz="1000" spc="-1" strike="noStrike">
-                          <a:solidFill>
-                            <a:srgbClr val="000000"/>
-                          </a:solidFill>
-                          <a:uFill>
-                            <a:solidFill>
-                              <a:srgbClr val="ffffff"/>
-                            </a:solidFill>
-                          </a:uFill>
-                          <a:latin typeface="Arial"/>
-                          <a:ea typeface="Arial Narrow"/>
-                        </a:rPr>
-                        <a:t>Gerenciamento de serviços de manutenção ou conserto prestados por terceiros</a:t>
-                      </a:r>
-                      <a:endParaRPr b="0" lang="pt-BR" sz="1800" spc="-1" strike="noStrike">
-                        <a:solidFill>
-                          <a:srgbClr val="000000"/>
-                        </a:solidFill>
-                        <a:uFill>
-                          <a:solidFill>
-                            <a:srgbClr val="ffffff"/>
-                          </a:solidFill>
-                        </a:uFill>
-                        <a:latin typeface="Arial"/>
-                      </a:endParaRPr>
-                    </a:p>
-                  </a:txBody>
-                  <a:tcPr marL="68400" marR="68400">
-                    <a:lnL w="12240">
-                      <a:solidFill>
-                        <a:srgbClr val="ffffff"/>
-                      </a:solidFill>
-                    </a:lnL>
-                    <a:lnR w="12240">
-                      <a:solidFill>
-                        <a:srgbClr val="ffffff"/>
-                      </a:solidFill>
-                    </a:lnR>
-                    <a:lnT w="12240">
-                      <a:solidFill>
-                        <a:srgbClr val="ffffff"/>
-                      </a:solidFill>
-                    </a:lnT>
-                    <a:lnB w="12240">
-                      <a:solidFill>
-                        <a:srgbClr val="ffffff"/>
-                      </a:solidFill>
-                    </a:lnB>
-                    <a:solidFill>
-                      <a:srgbClr val="e9ecf3"/>
-                    </a:solidFill>
-                  </a:tcPr>
-                </a:tc>
-                <a:tc>
-                  <a:txBody>
-                    <a:bodyPr/>
-                    <a:p>
-                      <a:pPr algn="ctr">
-                        <a:lnSpc>
-                          <a:spcPct val="100000"/>
-                        </a:lnSpc>
-                      </a:pPr>
-                      <a:r>
-                        <a:rPr b="0" lang="pt-BR" sz="2000" spc="-1" strike="noStrike">
-                          <a:solidFill>
-                            <a:srgbClr val="000000"/>
-                          </a:solidFill>
-                          <a:uFill>
-                            <a:solidFill>
-                              <a:srgbClr val="ffffff"/>
-                            </a:solidFill>
-                          </a:uFill>
-                          <a:latin typeface="Arial"/>
-                          <a:ea typeface="DejaVu Sans"/>
-                        </a:rPr>
                         <a:t>3</a:t>
                       </a:r>
                       <a:endParaRPr b="0" lang="pt-BR" sz="1800" spc="-1" strike="noStrike">
@@ -13480,161 +12683,6 @@
                     </a:p>
                   </a:txBody>
                   <a:tcPr marL="91440" marR="91440">
-                    <a:lnL w="12240">
-                      <a:solidFill>
-                        <a:srgbClr val="ffffff"/>
-                      </a:solidFill>
-                    </a:lnL>
-                    <a:lnR w="12240">
-                      <a:solidFill>
-                        <a:srgbClr val="ffffff"/>
-                      </a:solidFill>
-                    </a:lnR>
-                    <a:lnT w="12240">
-                      <a:solidFill>
-                        <a:srgbClr val="ffffff"/>
-                      </a:solidFill>
-                    </a:lnT>
-                    <a:lnB w="12240">
-                      <a:solidFill>
-                        <a:srgbClr val="ffffff"/>
-                      </a:solidFill>
-                    </a:lnB>
-                    <a:solidFill>
-                      <a:srgbClr val="e9ecf3"/>
-                    </a:solidFill>
-                  </a:tcPr>
-                </a:tc>
-                <a:tc rowSpan="2">
-                  <a:tcPr marL="91440" marR="91440">
-                    <a:lnL w="12240">
-                      <a:solidFill>
-                        <a:srgbClr val="ffffff"/>
-                      </a:solidFill>
-                    </a:lnL>
-                    <a:lnR w="12240">
-                      <a:solidFill>
-                        <a:srgbClr val="ffffff"/>
-                      </a:solidFill>
-                    </a:lnR>
-                    <a:lnT w="12240">
-                      <a:solidFill>
-                        <a:srgbClr val="ffffff"/>
-                      </a:solidFill>
-                    </a:lnT>
-                    <a:lnB w="12240">
-                      <a:solidFill>
-                        <a:srgbClr val="ffffff"/>
-                      </a:solidFill>
-                    </a:lnB>
-                    <a:solidFill>
-                      <a:srgbClr val="e9ecf3"/>
-                    </a:solidFill>
-                  </a:tcPr>
-                </a:tc>
-              </a:tr>
-              <a:tr h="383040">
-                <a:tc>
-                  <a:txBody>
-                    <a:bodyPr lIns="68400" rIns="68400"/>
-                    <a:p>
-                      <a:pPr>
-                        <a:lnSpc>
-                          <a:spcPct val="115000"/>
-                        </a:lnSpc>
-                      </a:pPr>
-                      <a:r>
-                        <a:rPr b="0" lang="pt-BR" sz="1200" spc="-1" strike="noStrike">
-                          <a:solidFill>
-                            <a:srgbClr val="000000"/>
-                          </a:solidFill>
-                          <a:uFill>
-                            <a:solidFill>
-                              <a:srgbClr val="ffffff"/>
-                            </a:solidFill>
-                          </a:uFill>
-                          <a:latin typeface="Arial"/>
-                          <a:ea typeface="Calibri"/>
-                        </a:rPr>
-                        <a:t>11</a:t>
-                      </a:r>
-                      <a:endParaRPr b="0" lang="pt-BR" sz="1800" spc="-1" strike="noStrike">
-                        <a:solidFill>
-                          <a:srgbClr val="000000"/>
-                        </a:solidFill>
-                        <a:uFill>
-                          <a:solidFill>
-                            <a:srgbClr val="ffffff"/>
-                          </a:solidFill>
-                        </a:uFill>
-                        <a:latin typeface="Arial"/>
-                      </a:endParaRPr>
-                    </a:p>
-                  </a:txBody>
-                  <a:tcPr marL="68400" marR="68400">
-                    <a:lnL w="12240">
-                      <a:solidFill>
-                        <a:srgbClr val="ffffff"/>
-                      </a:solidFill>
-                    </a:lnL>
-                    <a:lnR w="12240">
-                      <a:solidFill>
-                        <a:srgbClr val="ffffff"/>
-                      </a:solidFill>
-                    </a:lnR>
-                    <a:lnT w="12240">
-                      <a:solidFill>
-                        <a:srgbClr val="ffffff"/>
-                      </a:solidFill>
-                    </a:lnT>
-                    <a:lnB w="12240">
-                      <a:solidFill>
-                        <a:srgbClr val="ffffff"/>
-                      </a:solidFill>
-                    </a:lnB>
-                    <a:solidFill>
-                      <a:srgbClr val="d0d8e7"/>
-                    </a:solidFill>
-                  </a:tcPr>
-                </a:tc>
-                <a:tc>
-                  <a:txBody>
-                    <a:bodyPr lIns="68400" rIns="68400"/>
-                    <a:p>
-                      <a:pPr>
-                        <a:lnSpc>
-                          <a:spcPct val="115000"/>
-                        </a:lnSpc>
-                      </a:pPr>
-                      <a:r>
-                        <a:rPr b="0" lang="pt-BR" sz="1000" spc="-1" strike="noStrike">
-                          <a:solidFill>
-                            <a:srgbClr val="000000"/>
-                          </a:solidFill>
-                          <a:uFill>
-                            <a:solidFill>
-                              <a:srgbClr val="ffffff"/>
-                            </a:solidFill>
-                          </a:uFill>
-                          <a:latin typeface="Arial"/>
-                          <a:ea typeface="Arial Narrow"/>
-                        </a:rPr>
-                        <a:t>Gerenciamento de serviços de manutenção ou conserto realizados internamente</a:t>
-                      </a:r>
-                      <a:endParaRPr b="0" lang="pt-BR" sz="1800" spc="-1" strike="noStrike">
-                        <a:solidFill>
-                          <a:srgbClr val="000000"/>
-                        </a:solidFill>
-                        <a:uFill>
-                          <a:solidFill>
-                            <a:srgbClr val="ffffff"/>
-                          </a:solidFill>
-                        </a:uFill>
-                        <a:latin typeface="Arial"/>
-                      </a:endParaRPr>
-                    </a:p>
-                  </a:txBody>
-                  <a:tcPr marL="68400" marR="68400">
                     <a:lnL w="12240">
                       <a:solidFill>
                         <a:srgbClr val="ffffff"/>
@@ -13664,13 +12712,8 @@
                   <a:txBody>
                     <a:bodyPr/>
                     <a:p>
-                      <a:pPr algn="ctr">
-                        <a:lnSpc>
-                          <a:spcPct val="100000"/>
-                        </a:lnSpc>
-                      </a:pPr>
                       <a:r>
-                        <a:rPr b="0" lang="pt-BR" sz="2000" spc="-1" strike="noStrike">
+                        <a:rPr b="0" lang="pt-BR" sz="2400" spc="-1" strike="noStrike">
                           <a:solidFill>
                             <a:srgbClr val="000000"/>
                           </a:solidFill>
@@ -13679,12 +12722,11 @@
                               <a:srgbClr val="ffffff"/>
                             </a:solidFill>
                           </a:uFill>
-                          <a:latin typeface="Arial"/>
-                          <a:ea typeface="DejaVu Sans"/>
+                          <a:latin typeface="Times New Roman"/>
                         </a:rPr>
-                        <a:t>3</a:t>
+                        <a:t>5</a:t>
                       </a:r>
-                      <a:endParaRPr b="0" lang="pt-BR" sz="1800" spc="-1" strike="noStrike">
+                      <a:endParaRPr b="0" lang="pt-BR" sz="2400" spc="-1" strike="noStrike">
                         <a:solidFill>
                           <a:srgbClr val="000000"/>
                         </a:solidFill>
@@ -13693,7 +12735,7 @@
                             <a:srgbClr val="ffffff"/>
                           </a:solidFill>
                         </a:uFill>
-                        <a:latin typeface="Arial"/>
+                        <a:latin typeface="Times New Roman"/>
                       </a:endParaRPr>
                     </a:p>
                   </a:txBody>
@@ -13786,7 +12828,7 @@
         <p:spPr>
           <a:xfrm>
             <a:off x="457200" y="274680"/>
-            <a:ext cx="8227800" cy="1141200"/>
+            <a:ext cx="8227440" cy="1140840"/>
           </a:xfrm>
           <a:prstGeom prst="rect">
             <a:avLst/>
@@ -13848,7 +12890,7 @@
         <p:spPr>
           <a:xfrm>
             <a:off x="457200" y="1600200"/>
-            <a:ext cx="8227800" cy="4524120"/>
+            <a:ext cx="8227440" cy="4523760"/>
           </a:xfrm>
           <a:prstGeom prst="rect">
             <a:avLst/>
@@ -13867,7 +12909,7 @@
         <p:txBody>
           <a:bodyPr lIns="90000" rIns="90000" tIns="45000" bIns="45000"/>
           <a:p>
-            <a:pPr marL="285840" indent="-284400" algn="just">
+            <a:pPr marL="285840" indent="-284040" algn="just">
               <a:lnSpc>
                 <a:spcPct val="100000"/>
               </a:lnSpc>
@@ -13905,7 +12947,7 @@
             </a:endParaRPr>
           </a:p>
           <a:p>
-            <a:pPr marL="285840" indent="-284400" algn="just">
+            <a:pPr marL="285840" indent="-284040" algn="just">
               <a:lnSpc>
                 <a:spcPct val="100000"/>
               </a:lnSpc>
@@ -13943,7 +12985,7 @@
             </a:endParaRPr>
           </a:p>
           <a:p>
-            <a:pPr marL="285840" indent="-284400" algn="just">
+            <a:pPr marL="285840" indent="-284040" algn="just">
               <a:lnSpc>
                 <a:spcPct val="100000"/>
               </a:lnSpc>
@@ -13981,7 +13023,7 @@
             </a:endParaRPr>
           </a:p>
           <a:p>
-            <a:pPr marL="285840" indent="-284400" algn="just">
+            <a:pPr marL="285840" indent="-284040" algn="just">
               <a:lnSpc>
                 <a:spcPct val="100000"/>
               </a:lnSpc>
@@ -14019,7 +13061,7 @@
             </a:endParaRPr>
           </a:p>
           <a:p>
-            <a:pPr marL="285840" indent="-284400" algn="just">
+            <a:pPr marL="285840" indent="-284040" algn="just">
               <a:lnSpc>
                 <a:spcPct val="100000"/>
               </a:lnSpc>
@@ -14072,7 +13114,7 @@
             </a:endParaRPr>
           </a:p>
           <a:p>
-            <a:pPr marL="285840" indent="-284400" algn="just">
+            <a:pPr marL="285840" indent="-284040" algn="just">
               <a:lnSpc>
                 <a:spcPct val="100000"/>
               </a:lnSpc>
@@ -14125,7 +13167,7 @@
             </a:endParaRPr>
           </a:p>
           <a:p>
-            <a:pPr marL="285840" indent="-284400" algn="just">
+            <a:pPr marL="285840" indent="-284040" algn="just">
               <a:lnSpc>
                 <a:spcPct val="100000"/>
               </a:lnSpc>
@@ -14255,7 +13297,7 @@
         <p:spPr>
           <a:xfrm>
             <a:off x="457200" y="274680"/>
-            <a:ext cx="8227800" cy="1141200"/>
+            <a:ext cx="8227440" cy="1140840"/>
           </a:xfrm>
           <a:prstGeom prst="rect">
             <a:avLst/>
@@ -14317,7 +13359,7 @@
         <p:spPr>
           <a:xfrm>
             <a:off x="457200" y="1600200"/>
-            <a:ext cx="8227800" cy="4524120"/>
+            <a:ext cx="8227440" cy="4523760"/>
           </a:xfrm>
           <a:prstGeom prst="rect">
             <a:avLst/>
@@ -14354,7 +13396,7 @@
             </a:endParaRPr>
           </a:p>
           <a:p>
-            <a:pPr marL="285840" indent="-284400" algn="just">
+            <a:pPr marL="285840" indent="-284040" algn="just">
               <a:lnSpc>
                 <a:spcPct val="100000"/>
               </a:lnSpc>
@@ -14407,7 +13449,7 @@
             </a:endParaRPr>
           </a:p>
           <a:p>
-            <a:pPr marL="285840" indent="-284400" algn="just">
+            <a:pPr marL="285840" indent="-284040" algn="just">
               <a:lnSpc>
                 <a:spcPct val="100000"/>
               </a:lnSpc>
@@ -14519,7 +13561,7 @@
         <p:spPr>
           <a:xfrm>
             <a:off x="372240" y="285480"/>
-            <a:ext cx="8227800" cy="1141200"/>
+            <a:ext cx="8227440" cy="1140840"/>
           </a:xfrm>
           <a:prstGeom prst="rect">
             <a:avLst/>

</xml_diff>

<commit_message>
Adicionado ata de reuniao da sprint2, implementado o requisito de gerenciar acesso biometrico, modificado arquivo js e modelo de gerenciar ativos
</commit_message>
<xml_diff>
--- a/Projeto SysTI/000-Gerencia Do Projeto/PPJ-Plano de Projeto.pptx
+++ b/Projeto SysTI/000-Gerencia Do Projeto/PPJ-Plano de Projeto.pptx
@@ -5560,7 +5560,7 @@
         <p:spPr>
           <a:xfrm>
             <a:off x="685800" y="2130480"/>
-            <a:ext cx="7770240" cy="1467720"/>
+            <a:ext cx="7769880" cy="1467360"/>
           </a:xfrm>
           <a:prstGeom prst="rect">
             <a:avLst/>
@@ -5650,7 +5650,7 @@
         <p:spPr>
           <a:xfrm>
             <a:off x="1371600" y="3886200"/>
-            <a:ext cx="6398640" cy="1750320"/>
+            <a:ext cx="6398280" cy="1749960"/>
           </a:xfrm>
           <a:prstGeom prst="rect">
             <a:avLst/>
@@ -5761,7 +5761,7 @@
         <p:spPr>
           <a:xfrm>
             <a:off x="457200" y="274680"/>
-            <a:ext cx="8227440" cy="1140840"/>
+            <a:ext cx="8227080" cy="1140480"/>
           </a:xfrm>
           <a:prstGeom prst="rect">
             <a:avLst/>
@@ -7812,7 +7812,7 @@
         <p:spPr>
           <a:xfrm>
             <a:off x="457200" y="274680"/>
-            <a:ext cx="8227440" cy="1140840"/>
+            <a:ext cx="8227080" cy="1140480"/>
           </a:xfrm>
           <a:prstGeom prst="rect">
             <a:avLst/>
@@ -7874,7 +7874,7 @@
         <p:spPr>
           <a:xfrm>
             <a:off x="457200" y="1600200"/>
-            <a:ext cx="8227440" cy="4523760"/>
+            <a:ext cx="8227080" cy="4523400"/>
           </a:xfrm>
           <a:prstGeom prst="rect">
             <a:avLst/>
@@ -7893,7 +7893,7 @@
         <p:txBody>
           <a:bodyPr lIns="90000" rIns="90000" tIns="45000" bIns="45000"/>
           <a:p>
-            <a:pPr marL="343080" indent="-340920">
+            <a:pPr marL="343080" indent="-340560">
               <a:lnSpc>
                 <a:spcPct val="100000"/>
               </a:lnSpc>
@@ -7931,7 +7931,7 @@
             </a:endParaRPr>
           </a:p>
           <a:p>
-            <a:pPr marL="343080" indent="-340920">
+            <a:pPr marL="343080" indent="-340560">
               <a:lnSpc>
                 <a:spcPct val="100000"/>
               </a:lnSpc>
@@ -7969,7 +7969,7 @@
             </a:endParaRPr>
           </a:p>
           <a:p>
-            <a:pPr marL="343080" indent="-340920">
+            <a:pPr marL="343080" indent="-340560">
               <a:lnSpc>
                 <a:spcPct val="100000"/>
               </a:lnSpc>
@@ -8007,7 +8007,7 @@
             </a:endParaRPr>
           </a:p>
           <a:p>
-            <a:pPr marL="343080" indent="-340920">
+            <a:pPr marL="343080" indent="-340560">
               <a:lnSpc>
                 <a:spcPct val="100000"/>
               </a:lnSpc>
@@ -8045,7 +8045,7 @@
             </a:endParaRPr>
           </a:p>
           <a:p>
-            <a:pPr marL="343080" indent="-340920">
+            <a:pPr marL="343080" indent="-340560">
               <a:lnSpc>
                 <a:spcPct val="100000"/>
               </a:lnSpc>
@@ -8083,7 +8083,7 @@
             </a:endParaRPr>
           </a:p>
           <a:p>
-            <a:pPr marL="343080" indent="-340920">
+            <a:pPr marL="343080" indent="-340560">
               <a:lnSpc>
                 <a:spcPct val="100000"/>
               </a:lnSpc>
@@ -8121,7 +8121,7 @@
             </a:endParaRPr>
           </a:p>
           <a:p>
-            <a:pPr marL="343080" indent="-340920">
+            <a:pPr marL="343080" indent="-340560">
               <a:lnSpc>
                 <a:spcPct val="100000"/>
               </a:lnSpc>
@@ -8236,7 +8236,7 @@
         <p:spPr>
           <a:xfrm>
             <a:off x="457200" y="274680"/>
-            <a:ext cx="8227440" cy="1140840"/>
+            <a:ext cx="8227080" cy="1140480"/>
           </a:xfrm>
           <a:prstGeom prst="rect">
             <a:avLst/>
@@ -8298,7 +8298,7 @@
         <p:spPr>
           <a:xfrm>
             <a:off x="457200" y="1600200"/>
-            <a:ext cx="8227440" cy="4523760"/>
+            <a:ext cx="8227080" cy="4523400"/>
           </a:xfrm>
           <a:prstGeom prst="rect">
             <a:avLst/>
@@ -8409,7 +8409,7 @@
         <p:spPr>
           <a:xfrm>
             <a:off x="457200" y="274680"/>
-            <a:ext cx="8227440" cy="1140840"/>
+            <a:ext cx="8227080" cy="1140480"/>
           </a:xfrm>
           <a:prstGeom prst="rect">
             <a:avLst/>
@@ -8948,7 +8948,7 @@
         <p:spPr>
           <a:xfrm>
             <a:off x="457200" y="274680"/>
-            <a:ext cx="8227440" cy="1140840"/>
+            <a:ext cx="8227080" cy="1140480"/>
           </a:xfrm>
           <a:prstGeom prst="rect">
             <a:avLst/>
@@ -10037,7 +10037,7 @@
         <p:spPr>
           <a:xfrm>
             <a:off x="457200" y="274680"/>
-            <a:ext cx="8227440" cy="1140840"/>
+            <a:ext cx="8227080" cy="1140480"/>
           </a:xfrm>
           <a:prstGeom prst="rect">
             <a:avLst/>
@@ -10098,7 +10098,7 @@
         </p:nvGraphicFramePr>
         <p:xfrm>
           <a:off x="563400" y="1297080"/>
-          <a:ext cx="8076600" cy="4649400"/>
+          <a:ext cx="8345160" cy="3447000"/>
         </p:xfrm>
         <a:graphic>
           <a:graphicData uri="http://schemas.openxmlformats.org/drawingml/2006/table">
@@ -10317,135 +10317,9 @@
                           </a:uFill>
                           <a:latin typeface="Times New Roman"/>
                         </a:rPr>
-                        <a:t>E</a:t>
+                        <a:t>Estimativa</a:t>
                       </a:r>
-                      <a:r>
-                        <a:rPr b="0" lang="pt-BR" sz="2400" spc="-1" strike="noStrike">
-                          <a:solidFill>
-                            <a:srgbClr val="000000"/>
-                          </a:solidFill>
-                          <a:uFill>
-                            <a:solidFill>
-                              <a:srgbClr val="ffffff"/>
-                            </a:solidFill>
-                          </a:uFill>
-                          <a:latin typeface="Times New Roman"/>
-                        </a:rPr>
-                        <a:t>s</a:t>
-                      </a:r>
-                      <a:r>
-                        <a:rPr b="0" lang="pt-BR" sz="2400" spc="-1" strike="noStrike">
-                          <a:solidFill>
-                            <a:srgbClr val="000000"/>
-                          </a:solidFill>
-                          <a:uFill>
-                            <a:solidFill>
-                              <a:srgbClr val="ffffff"/>
-                            </a:solidFill>
-                          </a:uFill>
-                          <a:latin typeface="Times New Roman"/>
-                        </a:rPr>
-                        <a:t>t</a:t>
-                      </a:r>
-                      <a:r>
-                        <a:rPr b="0" lang="pt-BR" sz="2400" spc="-1" strike="noStrike">
-                          <a:solidFill>
-                            <a:srgbClr val="000000"/>
-                          </a:solidFill>
-                          <a:uFill>
-                            <a:solidFill>
-                              <a:srgbClr val="ffffff"/>
-                            </a:solidFill>
-                          </a:uFill>
-                          <a:latin typeface="Times New Roman"/>
-                        </a:rPr>
-                        <a:t>i</a:t>
-                      </a:r>
-                      <a:r>
-                        <a:rPr b="0" lang="pt-BR" sz="2400" spc="-1" strike="noStrike">
-                          <a:solidFill>
-                            <a:srgbClr val="000000"/>
-                          </a:solidFill>
-                          <a:uFill>
-                            <a:solidFill>
-                              <a:srgbClr val="ffffff"/>
-                            </a:solidFill>
-                          </a:uFill>
-                          <a:latin typeface="Times New Roman"/>
-                        </a:rPr>
-                        <a:t>m</a:t>
-                      </a:r>
-                      <a:r>
-                        <a:rPr b="0" lang="pt-BR" sz="2400" spc="-1" strike="noStrike">
-                          <a:solidFill>
-                            <a:srgbClr val="000000"/>
-                          </a:solidFill>
-                          <a:uFill>
-                            <a:solidFill>
-                              <a:srgbClr val="ffffff"/>
-                            </a:solidFill>
-                          </a:uFill>
-                          <a:latin typeface="Times New Roman"/>
-                        </a:rPr>
-                        <a:t>a</a:t>
-                      </a:r>
-                      <a:r>
-                        <a:rPr b="0" lang="pt-BR" sz="2400" spc="-1" strike="noStrike">
-                          <a:solidFill>
-                            <a:srgbClr val="000000"/>
-                          </a:solidFill>
-                          <a:uFill>
-                            <a:solidFill>
-                              <a:srgbClr val="ffffff"/>
-                            </a:solidFill>
-                          </a:uFill>
-                          <a:latin typeface="Times New Roman"/>
-                        </a:rPr>
-                        <a:t>t</a:t>
-                      </a:r>
-                      <a:r>
-                        <a:rPr b="0" lang="pt-BR" sz="2400" spc="-1" strike="noStrike">
-                          <a:solidFill>
-                            <a:srgbClr val="000000"/>
-                          </a:solidFill>
-                          <a:uFill>
-                            <a:solidFill>
-                              <a:srgbClr val="ffffff"/>
-                            </a:solidFill>
-                          </a:uFill>
-                          <a:latin typeface="Times New Roman"/>
-                        </a:rPr>
-                        <a:t>i</a:t>
-                      </a:r>
-                      <a:r>
-                        <a:rPr b="0" lang="pt-BR" sz="2400" spc="-1" strike="noStrike">
-                          <a:solidFill>
-                            <a:srgbClr val="000000"/>
-                          </a:solidFill>
-                          <a:uFill>
-                            <a:solidFill>
-                              <a:srgbClr val="ffffff"/>
-                            </a:solidFill>
-                          </a:uFill>
-                          <a:latin typeface="Times New Roman"/>
-                        </a:rPr>
-                        <a:t>v</a:t>
-                      </a:r>
-                      <a:r>
-                        <a:rPr b="0" lang="pt-BR" sz="2400" spc="-1" strike="noStrike">
-                          <a:solidFill>
-                            <a:srgbClr val="000000"/>
-                          </a:solidFill>
-                          <a:uFill>
-                            <a:solidFill>
-                              <a:srgbClr val="ffffff"/>
-                            </a:solidFill>
-                          </a:uFill>
-                          <a:latin typeface="Times New Roman"/>
-                        </a:rPr>
-                        <a:t>a</a:t>
-                      </a:r>
-                      <a:endParaRPr b="0" lang="pt-BR" sz="2400" spc="-1" strike="noStrike">
+                      <a:endParaRPr b="0" lang="pt-BR" sz="1800" spc="-1" strike="noStrike">
                         <a:solidFill>
                           <a:srgbClr val="000000"/>
                         </a:solidFill>
@@ -10454,7 +10328,7 @@
                             <a:srgbClr val="ffffff"/>
                           </a:solidFill>
                         </a:uFill>
-                        <a:latin typeface="Times New Roman"/>
+                        <a:latin typeface="Arial"/>
                       </a:endParaRPr>
                     </a:p>
                   </a:txBody>
@@ -10502,7 +10376,7 @@
                         </a:rPr>
                         <a:t>Release</a:t>
                       </a:r>
-                      <a:endParaRPr b="0" lang="pt-BR" sz="2400" spc="-1" strike="noStrike">
+                      <a:endParaRPr b="0" lang="pt-BR" sz="1800" spc="-1" strike="noStrike">
                         <a:solidFill>
                           <a:srgbClr val="000000"/>
                         </a:solidFill>
@@ -10511,7 +10385,7 @@
                             <a:srgbClr val="ffffff"/>
                           </a:solidFill>
                         </a:uFill>
-                        <a:latin typeface="Times New Roman"/>
+                        <a:latin typeface="Arial"/>
                       </a:endParaRPr>
                     </a:p>
                   </a:txBody>
@@ -10750,7 +10624,7 @@
                         </a:rPr>
                         <a:t>8</a:t>
                       </a:r>
-                      <a:endParaRPr b="0" lang="pt-BR" sz="2400" spc="-1" strike="noStrike">
+                      <a:endParaRPr b="0" lang="pt-BR" sz="1800" spc="-1" strike="noStrike">
                         <a:solidFill>
                           <a:srgbClr val="000000"/>
                         </a:solidFill>
@@ -10759,7 +10633,7 @@
                             <a:srgbClr val="ffffff"/>
                           </a:solidFill>
                         </a:uFill>
-                        <a:latin typeface="Times New Roman"/>
+                        <a:latin typeface="Arial"/>
                       </a:endParaRPr>
                     </a:p>
                   </a:txBody>
@@ -10807,7 +10681,7 @@
                         </a:rPr>
                         <a:t>1</a:t>
                       </a:r>
-                      <a:endParaRPr b="0" lang="pt-BR" sz="2400" spc="-1" strike="noStrike">
+                      <a:endParaRPr b="0" lang="pt-BR" sz="1800" spc="-1" strike="noStrike">
                         <a:solidFill>
                           <a:srgbClr val="000000"/>
                         </a:solidFill>
@@ -10816,7 +10690,7 @@
                             <a:srgbClr val="ffffff"/>
                           </a:solidFill>
                         </a:uFill>
-                        <a:latin typeface="Times New Roman"/>
+                        <a:latin typeface="Arial"/>
                       </a:endParaRPr>
                     </a:p>
                   </a:txBody>
@@ -10870,7 +10744,7 @@
                           <a:latin typeface="Arial"/>
                           <a:ea typeface="DejaVu Sans"/>
                         </a:rPr>
-                        <a:t>4</a:t>
+                        <a:t>2</a:t>
                       </a:r>
                       <a:endParaRPr b="0" lang="pt-BR" sz="1800" spc="-1" strike="noStrike">
                         <a:solidFill>
@@ -11069,7 +10943,7 @@
                         </a:rPr>
                         <a:t>1</a:t>
                       </a:r>
-                      <a:endParaRPr b="0" lang="pt-BR" sz="2400" spc="-1" strike="noStrike">
+                      <a:endParaRPr b="0" lang="pt-BR" sz="1800" spc="-1" strike="noStrike">
                         <a:solidFill>
                           <a:srgbClr val="000000"/>
                         </a:solidFill>
@@ -11078,7 +10952,7 @@
                             <a:srgbClr val="ffffff"/>
                           </a:solidFill>
                         </a:uFill>
-                        <a:latin typeface="Times New Roman"/>
+                        <a:latin typeface="Arial"/>
                       </a:endParaRPr>
                     </a:p>
                   </a:txBody>
@@ -11132,7 +11006,7 @@
                           <a:latin typeface="Arial"/>
                           <a:ea typeface="DejaVu Sans"/>
                         </a:rPr>
-                        <a:t>5</a:t>
+                        <a:t>3</a:t>
                       </a:r>
                       <a:endParaRPr b="0" lang="pt-BR" sz="1800" spc="-1" strike="noStrike">
                         <a:solidFill>
@@ -11317,7 +11191,7 @@
                         </a:rPr>
                         <a:t>2</a:t>
                       </a:r>
-                      <a:endParaRPr b="0" lang="pt-BR" sz="2400" spc="-1" strike="noStrike">
+                      <a:endParaRPr b="0" lang="pt-BR" sz="1800" spc="-1" strike="noStrike">
                         <a:solidFill>
                           <a:srgbClr val="000000"/>
                         </a:solidFill>
@@ -11326,7 +11200,7 @@
                             <a:srgbClr val="ffffff"/>
                           </a:solidFill>
                         </a:uFill>
-                        <a:latin typeface="Times New Roman"/>
+                        <a:latin typeface="Arial"/>
                       </a:endParaRPr>
                     </a:p>
                   </a:txBody>
@@ -11374,7 +11248,7 @@
                         </a:rPr>
                         <a:t>2</a:t>
                       </a:r>
-                      <a:endParaRPr b="0" lang="pt-BR" sz="2400" spc="-1" strike="noStrike">
+                      <a:endParaRPr b="0" lang="pt-BR" sz="1800" spc="-1" strike="noStrike">
                         <a:solidFill>
                           <a:srgbClr val="000000"/>
                         </a:solidFill>
@@ -11383,7 +11257,7 @@
                             <a:srgbClr val="ffffff"/>
                           </a:solidFill>
                         </a:uFill>
-                        <a:latin typeface="Times New Roman"/>
+                        <a:latin typeface="Arial"/>
                       </a:endParaRPr>
                     </a:p>
                   </a:txBody>
@@ -11437,7 +11311,7 @@
                           <a:latin typeface="Arial"/>
                           <a:ea typeface="DejaVu Sans"/>
                         </a:rPr>
-                        <a:t>7</a:t>
+                        <a:t>4</a:t>
                       </a:r>
                       <a:endParaRPr b="0" lang="pt-BR" sz="1800" spc="-1" strike="noStrike">
                         <a:solidFill>
@@ -11621,7 +11495,7 @@
                         </a:rPr>
                         <a:t>3</a:t>
                       </a:r>
-                      <a:endParaRPr b="0" lang="pt-BR" sz="2400" spc="-1" strike="noStrike">
+                      <a:endParaRPr b="0" lang="pt-BR" sz="1800" spc="-1" strike="noStrike">
                         <a:solidFill>
                           <a:srgbClr val="000000"/>
                         </a:solidFill>
@@ -11630,7 +11504,7 @@
                             <a:srgbClr val="ffffff"/>
                           </a:solidFill>
                         </a:uFill>
-                        <a:latin typeface="Times New Roman"/>
+                        <a:latin typeface="Arial"/>
                       </a:endParaRPr>
                     </a:p>
                   </a:txBody>
@@ -11684,7 +11558,7 @@
                           <a:latin typeface="Arial"/>
                           <a:ea typeface="Calibri"/>
                         </a:rPr>
-                        <a:t>8</a:t>
+                        <a:t>5</a:t>
                       </a:r>
                       <a:endParaRPr b="0" lang="pt-BR" sz="1800" spc="-1" strike="noStrike">
                         <a:solidFill>
@@ -11868,7 +11742,7 @@
                         </a:rPr>
                         <a:t>3</a:t>
                       </a:r>
-                      <a:endParaRPr b="0" lang="pt-BR" sz="2400" spc="-1" strike="noStrike">
+                      <a:endParaRPr b="0" lang="pt-BR" sz="1800" spc="-1" strike="noStrike">
                         <a:solidFill>
                           <a:srgbClr val="000000"/>
                         </a:solidFill>
@@ -11877,7 +11751,7 @@
                             <a:srgbClr val="ffffff"/>
                           </a:solidFill>
                         </a:uFill>
-                        <a:latin typeface="Times New Roman"/>
+                        <a:latin typeface="Arial"/>
                       </a:endParaRPr>
                     </a:p>
                   </a:txBody>
@@ -11925,7 +11799,7 @@
                         </a:rPr>
                         <a:t>4</a:t>
                       </a:r>
-                      <a:endParaRPr b="0" lang="pt-BR" sz="2400" spc="-1" strike="noStrike">
+                      <a:endParaRPr b="0" lang="pt-BR" sz="1800" spc="-1" strike="noStrike">
                         <a:solidFill>
                           <a:srgbClr val="000000"/>
                         </a:solidFill>
@@ -11934,7 +11808,7 @@
                             <a:srgbClr val="ffffff"/>
                           </a:solidFill>
                         </a:uFill>
-                        <a:latin typeface="Times New Roman"/>
+                        <a:latin typeface="Arial"/>
                       </a:endParaRPr>
                     </a:p>
                   </a:txBody>
@@ -11988,7 +11862,7 @@
                           <a:latin typeface="Arial"/>
                           <a:ea typeface="Calibri"/>
                         </a:rPr>
-                        <a:t>9</a:t>
+                        <a:t>6</a:t>
                       </a:r>
                       <a:endParaRPr b="0" lang="pt-BR" sz="1800" spc="-1" strike="noStrike">
                         <a:solidFill>
@@ -12173,7 +12047,7 @@
                         </a:rPr>
                         <a:t>3</a:t>
                       </a:r>
-                      <a:endParaRPr b="0" lang="pt-BR" sz="2400" spc="-1" strike="noStrike">
+                      <a:endParaRPr b="0" lang="pt-BR" sz="1800" spc="-1" strike="noStrike">
                         <a:solidFill>
                           <a:srgbClr val="000000"/>
                         </a:solidFill>
@@ -12182,7 +12056,7 @@
                             <a:srgbClr val="ffffff"/>
                           </a:solidFill>
                         </a:uFill>
-                        <a:latin typeface="Times New Roman"/>
+                        <a:latin typeface="Arial"/>
                       </a:endParaRPr>
                     </a:p>
                   </a:txBody>
@@ -12236,7 +12110,7 @@
                           <a:latin typeface="Arial"/>
                           <a:ea typeface="Calibri"/>
                         </a:rPr>
-                        <a:t>10</a:t>
+                        <a:t>7</a:t>
                       </a:r>
                       <a:endParaRPr b="0" lang="pt-BR" sz="1800" spc="-1" strike="noStrike">
                         <a:solidFill>
@@ -12421,7 +12295,7 @@
                         </a:rPr>
                         <a:t>5</a:t>
                       </a:r>
-                      <a:endParaRPr b="0" lang="pt-BR" sz="2400" spc="-1" strike="noStrike">
+                      <a:endParaRPr b="0" lang="pt-BR" sz="1800" spc="-1" strike="noStrike">
                         <a:solidFill>
                           <a:srgbClr val="000000"/>
                         </a:solidFill>
@@ -12430,7 +12304,7 @@
                             <a:srgbClr val="ffffff"/>
                           </a:solidFill>
                         </a:uFill>
-                        <a:latin typeface="Times New Roman"/>
+                        <a:latin typeface="Arial"/>
                       </a:endParaRPr>
                     </a:p>
                   </a:txBody>
@@ -12478,7 +12352,7 @@
                         </a:rPr>
                         <a:t>3</a:t>
                       </a:r>
-                      <a:endParaRPr b="0" lang="pt-BR" sz="2400" spc="-1" strike="noStrike">
+                      <a:endParaRPr b="0" lang="pt-BR" sz="1800" spc="-1" strike="noStrike">
                         <a:solidFill>
                           <a:srgbClr val="000000"/>
                         </a:solidFill>
@@ -12487,7 +12361,7 @@
                             <a:srgbClr val="ffffff"/>
                           </a:solidFill>
                         </a:uFill>
-                        <a:latin typeface="Times New Roman"/>
+                        <a:latin typeface="Arial"/>
                       </a:endParaRPr>
                     </a:p>
                   </a:txBody>
@@ -12541,7 +12415,7 @@
                           <a:latin typeface="Arial"/>
                           <a:ea typeface="Calibri"/>
                         </a:rPr>
-                        <a:t>11</a:t>
+                        <a:t>8</a:t>
                       </a:r>
                       <a:endParaRPr b="0" lang="pt-BR" sz="1800" spc="-1" strike="noStrike">
                         <a:solidFill>
@@ -12726,7 +12600,7 @@
                         </a:rPr>
                         <a:t>5</a:t>
                       </a:r>
-                      <a:endParaRPr b="0" lang="pt-BR" sz="2400" spc="-1" strike="noStrike">
+                      <a:endParaRPr b="0" lang="pt-BR" sz="1800" spc="-1" strike="noStrike">
                         <a:solidFill>
                           <a:srgbClr val="000000"/>
                         </a:solidFill>
@@ -12735,7 +12609,7 @@
                             <a:srgbClr val="ffffff"/>
                           </a:solidFill>
                         </a:uFill>
-                        <a:latin typeface="Times New Roman"/>
+                        <a:latin typeface="Arial"/>
                       </a:endParaRPr>
                     </a:p>
                   </a:txBody>
@@ -12828,7 +12702,7 @@
         <p:spPr>
           <a:xfrm>
             <a:off x="457200" y="274680"/>
-            <a:ext cx="8227440" cy="1140840"/>
+            <a:ext cx="8227080" cy="1140480"/>
           </a:xfrm>
           <a:prstGeom prst="rect">
             <a:avLst/>
@@ -12890,7 +12764,7 @@
         <p:spPr>
           <a:xfrm>
             <a:off x="457200" y="1600200"/>
-            <a:ext cx="8227440" cy="4523760"/>
+            <a:ext cx="8227080" cy="4523400"/>
           </a:xfrm>
           <a:prstGeom prst="rect">
             <a:avLst/>
@@ -12909,7 +12783,7 @@
         <p:txBody>
           <a:bodyPr lIns="90000" rIns="90000" tIns="45000" bIns="45000"/>
           <a:p>
-            <a:pPr marL="285840" indent="-284040" algn="just">
+            <a:pPr marL="285840" indent="-283680" algn="just">
               <a:lnSpc>
                 <a:spcPct val="100000"/>
               </a:lnSpc>
@@ -12947,7 +12821,7 @@
             </a:endParaRPr>
           </a:p>
           <a:p>
-            <a:pPr marL="285840" indent="-284040" algn="just">
+            <a:pPr marL="285840" indent="-283680" algn="just">
               <a:lnSpc>
                 <a:spcPct val="100000"/>
               </a:lnSpc>
@@ -12985,7 +12859,7 @@
             </a:endParaRPr>
           </a:p>
           <a:p>
-            <a:pPr marL="285840" indent="-284040" algn="just">
+            <a:pPr marL="285840" indent="-283680" algn="just">
               <a:lnSpc>
                 <a:spcPct val="100000"/>
               </a:lnSpc>
@@ -13023,7 +12897,7 @@
             </a:endParaRPr>
           </a:p>
           <a:p>
-            <a:pPr marL="285840" indent="-284040" algn="just">
+            <a:pPr marL="285840" indent="-283680" algn="just">
               <a:lnSpc>
                 <a:spcPct val="100000"/>
               </a:lnSpc>
@@ -13061,7 +12935,7 @@
             </a:endParaRPr>
           </a:p>
           <a:p>
-            <a:pPr marL="285840" indent="-284040" algn="just">
+            <a:pPr marL="285840" indent="-283680" algn="just">
               <a:lnSpc>
                 <a:spcPct val="100000"/>
               </a:lnSpc>
@@ -13114,7 +12988,7 @@
             </a:endParaRPr>
           </a:p>
           <a:p>
-            <a:pPr marL="285840" indent="-284040" algn="just">
+            <a:pPr marL="285840" indent="-283680" algn="just">
               <a:lnSpc>
                 <a:spcPct val="100000"/>
               </a:lnSpc>
@@ -13167,7 +13041,7 @@
             </a:endParaRPr>
           </a:p>
           <a:p>
-            <a:pPr marL="285840" indent="-284040" algn="just">
+            <a:pPr marL="285840" indent="-283680" algn="just">
               <a:lnSpc>
                 <a:spcPct val="100000"/>
               </a:lnSpc>
@@ -13297,7 +13171,7 @@
         <p:spPr>
           <a:xfrm>
             <a:off x="457200" y="274680"/>
-            <a:ext cx="8227440" cy="1140840"/>
+            <a:ext cx="8227080" cy="1140480"/>
           </a:xfrm>
           <a:prstGeom prst="rect">
             <a:avLst/>
@@ -13359,7 +13233,7 @@
         <p:spPr>
           <a:xfrm>
             <a:off x="457200" y="1600200"/>
-            <a:ext cx="8227440" cy="4523760"/>
+            <a:ext cx="8227080" cy="4523400"/>
           </a:xfrm>
           <a:prstGeom prst="rect">
             <a:avLst/>
@@ -13396,7 +13270,7 @@
             </a:endParaRPr>
           </a:p>
           <a:p>
-            <a:pPr marL="285840" indent="-284040" algn="just">
+            <a:pPr marL="285840" indent="-283680" algn="just">
               <a:lnSpc>
                 <a:spcPct val="100000"/>
               </a:lnSpc>
@@ -13449,7 +13323,7 @@
             </a:endParaRPr>
           </a:p>
           <a:p>
-            <a:pPr marL="285840" indent="-284040" algn="just">
+            <a:pPr marL="285840" indent="-283680" algn="just">
               <a:lnSpc>
                 <a:spcPct val="100000"/>
               </a:lnSpc>
@@ -13561,7 +13435,7 @@
         <p:spPr>
           <a:xfrm>
             <a:off x="372240" y="285480"/>
-            <a:ext cx="8227440" cy="1140840"/>
+            <a:ext cx="8227080" cy="1140480"/>
           </a:xfrm>
           <a:prstGeom prst="rect">
             <a:avLst/>

</xml_diff>